<commit_message>
2024 school year changes
</commit_message>
<xml_diff>
--- a/prezentacije/TA i Selenium osnove - class 1.pptx
+++ b/prezentacije/TA i Selenium osnove - class 1.pptx
@@ -5,10 +5,10 @@
     <p:sldMasterId id="2147483699" r:id="rId4"/>
   </p:sldMasterIdLst>
   <p:notesMasterIdLst>
-    <p:notesMasterId r:id="rId40"/>
+    <p:notesMasterId r:id="rId37"/>
   </p:notesMasterIdLst>
   <p:handoutMasterIdLst>
-    <p:handoutMasterId r:id="rId41"/>
+    <p:handoutMasterId r:id="rId38"/>
   </p:handoutMasterIdLst>
   <p:sldIdLst>
     <p:sldId id="281" r:id="rId5"/>
@@ -42,10 +42,7 @@
     <p:sldId id="623" r:id="rId33"/>
     <p:sldId id="611" r:id="rId34"/>
     <p:sldId id="601" r:id="rId35"/>
-    <p:sldId id="617" r:id="rId36"/>
-    <p:sldId id="625" r:id="rId37"/>
-    <p:sldId id="627" r:id="rId38"/>
-    <p:sldId id="635" r:id="rId39"/>
+    <p:sldId id="635" r:id="rId36"/>
   </p:sldIdLst>
   <p:sldSz cx="12192000" cy="6858000"/>
   <p:notesSz cx="7099300" cy="10234613"/>
@@ -255,7 +252,7 @@
           <a:p>
             <a:fld id="{F4985468-EA09-47E3-8036-5BF84197CAEF}" type="datetimeFigureOut">
               <a:rPr lang="en-GB" smtClean="0"/>
-              <a:t>12/10/2022</a:t>
+              <a:t>02/10/2024</a:t>
             </a:fld>
             <a:endParaRPr lang="en-GB"/>
           </a:p>
@@ -420,7 +417,7 @@
           <a:p>
             <a:fld id="{C303BD5E-F603-431C-B79D-697385AE35AF}" type="datetimeFigureOut">
               <a:rPr lang="en-GB" smtClean="0"/>
-              <a:t>12/10/2022</a:t>
+              <a:t>02/10/2024</a:t>
             </a:fld>
             <a:endParaRPr lang="en-GB"/>
           </a:p>
@@ -2284,174 +2281,6 @@
 </p:notes>
 </file>
 
-<file path=ppt/notesSlides/notesSlide27.xml><?xml version="1.0" encoding="utf-8"?>
-<p:notes xmlns:a="http://schemas.openxmlformats.org/drawingml/2006/main" xmlns:r="http://schemas.openxmlformats.org/officeDocument/2006/relationships" xmlns:p="http://schemas.openxmlformats.org/presentationml/2006/main">
-  <p:cSld>
-    <p:spTree>
-      <p:nvGrpSpPr>
-        <p:cNvPr id="1" name=""/>
-        <p:cNvGrpSpPr/>
-        <p:nvPr/>
-      </p:nvGrpSpPr>
-      <p:grpSpPr>
-        <a:xfrm>
-          <a:off x="0" y="0"/>
-          <a:ext cx="0" cy="0"/>
-          <a:chOff x="0" y="0"/>
-          <a:chExt cx="0" cy="0"/>
-        </a:xfrm>
-      </p:grpSpPr>
-      <p:sp>
-        <p:nvSpPr>
-          <p:cNvPr id="2" name="Slide Image Placeholder 1"/>
-          <p:cNvSpPr>
-            <a:spLocks noGrp="1" noRot="1" noChangeAspect="1"/>
-          </p:cNvSpPr>
-          <p:nvPr>
-            <p:ph type="sldImg"/>
-          </p:nvPr>
-        </p:nvSpPr>
-        <p:spPr/>
-      </p:sp>
-      <p:sp>
-        <p:nvSpPr>
-          <p:cNvPr id="3" name="Notes Placeholder 2"/>
-          <p:cNvSpPr>
-            <a:spLocks noGrp="1"/>
-          </p:cNvSpPr>
-          <p:nvPr>
-            <p:ph type="body" idx="1"/>
-          </p:nvPr>
-        </p:nvSpPr>
-        <p:spPr/>
-        <p:txBody>
-          <a:bodyPr/>
-          <a:lstStyle/>
-          <a:p>
-            <a:endParaRPr lang="en-US"/>
-          </a:p>
-        </p:txBody>
-      </p:sp>
-      <p:sp>
-        <p:nvSpPr>
-          <p:cNvPr id="4" name="Slide Number Placeholder 3"/>
-          <p:cNvSpPr>
-            <a:spLocks noGrp="1"/>
-          </p:cNvSpPr>
-          <p:nvPr>
-            <p:ph type="sldNum" sz="quarter" idx="10"/>
-          </p:nvPr>
-        </p:nvSpPr>
-        <p:spPr/>
-        <p:txBody>
-          <a:bodyPr/>
-          <a:lstStyle/>
-          <a:p>
-            <a:fld id="{DC59FDB4-792A-4C30-B3CA-9A37EF575B96}" type="slidenum">
-              <a:rPr lang="en-GB" smtClean="0"/>
-              <a:t>32</a:t>
-            </a:fld>
-            <a:endParaRPr lang="en-GB"/>
-          </a:p>
-        </p:txBody>
-      </p:sp>
-    </p:spTree>
-    <p:extLst>
-      <p:ext uri="{BB962C8B-B14F-4D97-AF65-F5344CB8AC3E}">
-        <p14:creationId xmlns:p14="http://schemas.microsoft.com/office/powerpoint/2010/main" val="527673968"/>
-      </p:ext>
-    </p:extLst>
-  </p:cSld>
-  <p:clrMapOvr>
-    <a:masterClrMapping/>
-  </p:clrMapOvr>
-</p:notes>
-</file>
-
-<file path=ppt/notesSlides/notesSlide28.xml><?xml version="1.0" encoding="utf-8"?>
-<p:notes xmlns:a="http://schemas.openxmlformats.org/drawingml/2006/main" xmlns:r="http://schemas.openxmlformats.org/officeDocument/2006/relationships" xmlns:p="http://schemas.openxmlformats.org/presentationml/2006/main">
-  <p:cSld>
-    <p:spTree>
-      <p:nvGrpSpPr>
-        <p:cNvPr id="1" name=""/>
-        <p:cNvGrpSpPr/>
-        <p:nvPr/>
-      </p:nvGrpSpPr>
-      <p:grpSpPr>
-        <a:xfrm>
-          <a:off x="0" y="0"/>
-          <a:ext cx="0" cy="0"/>
-          <a:chOff x="0" y="0"/>
-          <a:chExt cx="0" cy="0"/>
-        </a:xfrm>
-      </p:grpSpPr>
-      <p:sp>
-        <p:nvSpPr>
-          <p:cNvPr id="2" name="Slide Image Placeholder 1"/>
-          <p:cNvSpPr>
-            <a:spLocks noGrp="1" noRot="1" noChangeAspect="1"/>
-          </p:cNvSpPr>
-          <p:nvPr>
-            <p:ph type="sldImg"/>
-          </p:nvPr>
-        </p:nvSpPr>
-        <p:spPr/>
-      </p:sp>
-      <p:sp>
-        <p:nvSpPr>
-          <p:cNvPr id="3" name="Notes Placeholder 2"/>
-          <p:cNvSpPr>
-            <a:spLocks noGrp="1"/>
-          </p:cNvSpPr>
-          <p:nvPr>
-            <p:ph type="body" idx="1"/>
-          </p:nvPr>
-        </p:nvSpPr>
-        <p:spPr/>
-        <p:txBody>
-          <a:bodyPr/>
-          <a:lstStyle/>
-          <a:p>
-            <a:endParaRPr lang="en-US"/>
-          </a:p>
-        </p:txBody>
-      </p:sp>
-      <p:sp>
-        <p:nvSpPr>
-          <p:cNvPr id="4" name="Slide Number Placeholder 3"/>
-          <p:cNvSpPr>
-            <a:spLocks noGrp="1"/>
-          </p:cNvSpPr>
-          <p:nvPr>
-            <p:ph type="sldNum" sz="quarter" idx="10"/>
-          </p:nvPr>
-        </p:nvSpPr>
-        <p:spPr/>
-        <p:txBody>
-          <a:bodyPr/>
-          <a:lstStyle/>
-          <a:p>
-            <a:fld id="{DC59FDB4-792A-4C30-B3CA-9A37EF575B96}" type="slidenum">
-              <a:rPr lang="en-GB" smtClean="0"/>
-              <a:t>34</a:t>
-            </a:fld>
-            <a:endParaRPr lang="en-GB"/>
-          </a:p>
-        </p:txBody>
-      </p:sp>
-    </p:spTree>
-    <p:extLst>
-      <p:ext uri="{BB962C8B-B14F-4D97-AF65-F5344CB8AC3E}">
-        <p14:creationId xmlns:p14="http://schemas.microsoft.com/office/powerpoint/2010/main" val="3535268213"/>
-      </p:ext>
-    </p:extLst>
-  </p:cSld>
-  <p:clrMapOvr>
-    <a:masterClrMapping/>
-  </p:clrMapOvr>
-</p:notes>
-</file>
-
 <file path=ppt/notesSlides/notesSlide3.xml><?xml version="1.0" encoding="utf-8"?>
 <p:notes xmlns:a="http://schemas.openxmlformats.org/drawingml/2006/main" xmlns:r="http://schemas.openxmlformats.org/officeDocument/2006/relationships" xmlns:p="http://schemas.openxmlformats.org/presentationml/2006/main">
   <p:cSld>
@@ -3000,7 +2829,48 @@
           <a:bodyPr/>
           <a:lstStyle/>
           <a:p>
-            <a:endParaRPr lang="en-US" dirty="0"/>
+            <a:r>
+              <a:rPr lang="en-US" dirty="0"/>
+              <a:t>Client -&gt; server protocol je W3C</a:t>
+            </a:r>
+          </a:p>
+          <a:p>
+            <a:r>
+              <a:rPr lang="en-US" dirty="0"/>
+              <a:t>Driver -&gt; Browser (</a:t>
+            </a:r>
+            <a:r>
+              <a:rPr lang="en-US" dirty="0" err="1"/>
+              <a:t>i</a:t>
+            </a:r>
+            <a:r>
+              <a:rPr lang="en-US" dirty="0"/>
+              <a:t> </a:t>
+            </a:r>
+            <a:r>
+              <a:rPr lang="en-US" dirty="0" err="1"/>
+              <a:t>obrnuto</a:t>
+            </a:r>
+            <a:r>
+              <a:rPr lang="en-US" dirty="0"/>
+              <a:t>) </a:t>
+            </a:r>
+            <a:r>
+              <a:rPr lang="en-US" dirty="0" err="1"/>
+              <a:t>komunikacija</a:t>
+            </a:r>
+            <a:r>
+              <a:rPr lang="en-US" dirty="0"/>
+              <a:t> ide </a:t>
+            </a:r>
+            <a:r>
+              <a:rPr lang="en-US" dirty="0" err="1"/>
+              <a:t>preko</a:t>
+            </a:r>
+            <a:r>
+              <a:rPr lang="en-US" dirty="0"/>
+              <a:t> http</a:t>
+            </a:r>
           </a:p>
         </p:txBody>
       </p:sp>
@@ -3865,7 +3735,7 @@
           </a:ln>
           <a:extLst>
             <a:ext uri="{C572A759-6A51-4108-AA02-DFA0A04FC94B}">
-              <ma14:wrappingTextBoxFlag xmlns:ma14="http://schemas.microsoft.com/office/mac/drawingml/2011/main" xmlns="" val="1"/>
+              <ma14:wrappingTextBoxFlag xmlns="" xmlns:ma14="http://schemas.microsoft.com/office/mac/drawingml/2011/main" val="1"/>
             </a:ext>
           </a:extLst>
         </p:spPr>
@@ -5487,7 +5357,7 @@
           </a:ln>
           <a:extLst>
             <a:ext uri="{C572A759-6A51-4108-AA02-DFA0A04FC94B}">
-              <ma14:wrappingTextBoxFlag xmlns:ma14="http://schemas.microsoft.com/office/mac/drawingml/2011/main" xmlns="" val="1"/>
+              <ma14:wrappingTextBoxFlag xmlns="" xmlns:ma14="http://schemas.microsoft.com/office/mac/drawingml/2011/main" val="1"/>
             </a:ext>
           </a:extLst>
         </p:spPr>
@@ -6133,7 +6003,7 @@
           </a:ln>
           <a:extLst>
             <a:ext uri="{C572A759-6A51-4108-AA02-DFA0A04FC94B}">
-              <ma14:wrappingTextBoxFlag xmlns:ma14="http://schemas.microsoft.com/office/mac/drawingml/2011/main" xmlns="" val="1"/>
+              <ma14:wrappingTextBoxFlag xmlns="" xmlns:ma14="http://schemas.microsoft.com/office/mac/drawingml/2011/main" val="1"/>
             </a:ext>
           </a:extLst>
         </p:spPr>
@@ -7363,7 +7233,7 @@
           </a:ln>
           <a:extLst>
             <a:ext uri="{C572A759-6A51-4108-AA02-DFA0A04FC94B}">
-              <ma14:wrappingTextBoxFlag xmlns:ma14="http://schemas.microsoft.com/office/mac/drawingml/2011/main" xmlns="" val="1"/>
+              <ma14:wrappingTextBoxFlag xmlns="" xmlns:ma14="http://schemas.microsoft.com/office/mac/drawingml/2011/main" val="1"/>
             </a:ext>
           </a:extLst>
         </p:spPr>
@@ -8678,7 +8548,7 @@
           </a:ln>
           <a:extLst>
             <a:ext uri="{C572A759-6A51-4108-AA02-DFA0A04FC94B}">
-              <ma14:wrappingTextBoxFlag xmlns:ma14="http://schemas.microsoft.com/office/mac/drawingml/2011/main" xmlns="" val="1"/>
+              <ma14:wrappingTextBoxFlag xmlns="" xmlns:ma14="http://schemas.microsoft.com/office/mac/drawingml/2011/main" val="1"/>
             </a:ext>
           </a:extLst>
         </p:spPr>
@@ -10586,7 +10456,7 @@
           </a:ln>
           <a:extLst>
             <a:ext uri="{C572A759-6A51-4108-AA02-DFA0A04FC94B}">
-              <ma14:wrappingTextBoxFlag xmlns:ma14="http://schemas.microsoft.com/office/mac/drawingml/2011/main" xmlns="" val="1"/>
+              <ma14:wrappingTextBoxFlag xmlns="" xmlns:ma14="http://schemas.microsoft.com/office/mac/drawingml/2011/main" val="1"/>
             </a:ext>
           </a:extLst>
         </p:spPr>
@@ -13298,8 +13168,28 @@
               <a:buNone/>
             </a:pPr>
             <a:r>
+              <a:rPr lang="en-US" dirty="0" err="1"/>
+              <a:t>Slavica</a:t>
+            </a:r>
+            <a:r>
               <a:rPr lang="en-US" dirty="0"/>
-              <a:t>Jelena Pete,</a:t>
+              <a:t> </a:t>
+            </a:r>
+            <a:r>
+              <a:rPr lang="en-US" dirty="0" err="1"/>
+              <a:t>Mastilović</a:t>
+            </a:r>
+            <a:r>
+              <a:rPr lang="en-US" dirty="0"/>
+              <a:t> </a:t>
+            </a:r>
+            <a:r>
+              <a:rPr lang="en-US" dirty="0" err="1"/>
+              <a:t>sulica</a:t>
+            </a:r>
+            <a:r>
+              <a:rPr lang="en-US" dirty="0"/>
+              <a:t>,</a:t>
             </a:r>
             <a:r>
               <a:rPr lang="sr-Latn-RS" dirty="0"/>
@@ -13814,7 +13704,7 @@
             </a:r>
             <a:r>
               <a:rPr lang="sr-Latn-RS" sz="1800" dirty="0"/>
-              <a:t>.5</a:t>
+              <a:t>.25</a:t>
             </a:r>
             <a:r>
               <a:rPr lang="en-US" sz="1800" dirty="0"/>
@@ -13829,8 +13719,12 @@
               <a:t>iza</a:t>
             </a:r>
             <a:r>
+              <a:rPr lang="sr-Latn-RS" sz="1800" dirty="0" err="1"/>
+              <a:t>šla</a:t>
+            </a:r>
+            <a:r>
               <a:rPr lang="sr-Latn-RS" sz="1800" dirty="0"/>
-              <a:t>šla pre nekoliko meseci</a:t>
+              <a:t> u Septembru 2024.</a:t>
             </a:r>
             <a:r>
               <a:rPr lang="en-US" sz="1800" dirty="0"/>
@@ -26991,7 +26885,7 @@
         <p:spPr>
           <a:xfrm>
             <a:off x="1091866" y="1383019"/>
-            <a:ext cx="10346198" cy="4955267"/>
+            <a:ext cx="10346198" cy="5696496"/>
           </a:xfrm>
           <a:prstGeom prst="rect">
             <a:avLst/>
@@ -27186,6 +27080,30 @@
                 <a:srgbClr val="DF411C"/>
               </a:buClr>
             </a:pPr>
+            <a:r>
+              <a:rPr lang="en-US" sz="2200" i="1" dirty="0" err="1">
+                <a:solidFill>
+                  <a:srgbClr val="FF0000"/>
+                </a:solidFill>
+              </a:rPr>
+              <a:t>Thread.sleep</a:t>
+            </a:r>
+            <a:r>
+              <a:rPr lang="en-US" sz="2200" i="1" dirty="0">
+                <a:solidFill>
+                  <a:srgbClr val="FF0000"/>
+                </a:solidFill>
+              </a:rPr>
+              <a:t>() </a:t>
+            </a:r>
+            <a:r>
+              <a:rPr lang="en-US" sz="2200" i="1" dirty="0"/>
+              <a:t>- </a:t>
+            </a:r>
+            <a:r>
+              <a:rPr lang="en-US" sz="2200" dirty="0" err="1"/>
+              <a:t>izbegavati</a:t>
+            </a:r>
             <a:endParaRPr lang="en-US" sz="2200" i="1" dirty="0">
               <a:solidFill>
                 <a:srgbClr val="FF0000"/>
@@ -27202,30 +27120,113 @@
               </a:buClr>
             </a:pPr>
             <a:r>
+              <a:rPr lang="en-US" sz="2200" dirty="0"/>
+              <a:t>Implicit wait – max </a:t>
+            </a:r>
+            <a:r>
+              <a:rPr lang="en-US" sz="2200" dirty="0" err="1"/>
+              <a:t>vreme</a:t>
+            </a:r>
+            <a:r>
+              <a:rPr lang="en-US" sz="2200" dirty="0"/>
+              <a:t> </a:t>
+            </a:r>
+            <a:r>
+              <a:rPr lang="en-US" sz="2200" dirty="0" err="1"/>
+              <a:t>čekanja</a:t>
+            </a:r>
+            <a:r>
+              <a:rPr lang="en-US" sz="2200" dirty="0"/>
+              <a:t> da driver </a:t>
+            </a:r>
+            <a:r>
+              <a:rPr lang="en-US" sz="2200" dirty="0" err="1"/>
+              <a:t>izvrši</a:t>
+            </a:r>
+            <a:r>
+              <a:rPr lang="en-US" sz="2200" dirty="0"/>
+              <a:t> </a:t>
+            </a:r>
+            <a:r>
+              <a:rPr lang="en-US" sz="2200" dirty="0" err="1"/>
+              <a:t>neku</a:t>
+            </a:r>
+            <a:r>
+              <a:rPr lang="en-US" sz="2200" dirty="0"/>
+              <a:t> </a:t>
+            </a:r>
+            <a:r>
+              <a:rPr lang="en-US" sz="2200" dirty="0" err="1"/>
+              <a:t>funkciju</a:t>
+            </a:r>
+            <a:endParaRPr lang="en-US" sz="2200" dirty="0"/>
+          </a:p>
+          <a:p>
+            <a:pPr marL="0" lvl="1" indent="0">
+              <a:lnSpc>
+                <a:spcPct val="200000"/>
+              </a:lnSpc>
+              <a:buClr>
+                <a:srgbClr val="DF411C"/>
+              </a:buClr>
+              <a:buNone/>
+            </a:pPr>
+            <a:r>
+              <a:rPr lang="en-US" sz="2200" i="1" dirty="0">
+                <a:solidFill>
+                  <a:srgbClr val="00B0F0"/>
+                </a:solidFill>
+              </a:rPr>
+              <a:t>	</a:t>
+            </a:r>
+            <a:r>
               <a:rPr lang="en-US" sz="2200" i="1" dirty="0" err="1">
                 <a:solidFill>
-                  <a:srgbClr val="FF0000"/>
+                  <a:srgbClr val="00B0F0"/>
                 </a:solidFill>
               </a:rPr>
-              <a:t>Thread.sleep</a:t>
+              <a:t>driver.manage</a:t>
             </a:r>
             <a:r>
               <a:rPr lang="en-US" sz="2200" i="1" dirty="0">
                 <a:solidFill>
-                  <a:srgbClr val="FF0000"/>
+                  <a:srgbClr val="00B0F0"/>
                 </a:solidFill>
               </a:rPr>
-              <a:t>() </a:t>
-            </a:r>
-            <a:r>
-              <a:rPr lang="en-US" sz="2200" i="1" dirty="0"/>
-              <a:t>- </a:t>
-            </a:r>
-            <a:r>
-              <a:rPr lang="en-US" sz="2200" dirty="0" err="1"/>
-              <a:t>izbegavati</a:t>
-            </a:r>
-            <a:endParaRPr lang="en-US" sz="2200" dirty="0"/>
+              <a:t>().timeouts().</a:t>
+            </a:r>
+            <a:r>
+              <a:rPr lang="en-US" sz="2200" i="1" dirty="0" err="1">
+                <a:solidFill>
+                  <a:srgbClr val="00B0F0"/>
+                </a:solidFill>
+              </a:rPr>
+              <a:t>implicitlyWait</a:t>
+            </a:r>
+            <a:r>
+              <a:rPr lang="en-US" sz="2200" i="1" dirty="0">
+                <a:solidFill>
+                  <a:srgbClr val="00B0F0"/>
+                </a:solidFill>
+              </a:rPr>
+              <a:t>(</a:t>
+            </a:r>
+            <a:r>
+              <a:rPr lang="en-US" sz="2200" i="1" dirty="0" err="1">
+                <a:solidFill>
+                  <a:srgbClr val="00B0F0"/>
+                </a:solidFill>
+              </a:rPr>
+              <a:t>Duration.ofSeconds</a:t>
+            </a:r>
+            <a:r>
+              <a:rPr lang="en-US" sz="2200" i="1" dirty="0">
+                <a:solidFill>
+                  <a:srgbClr val="00B0F0"/>
+                </a:solidFill>
+              </a:rPr>
+              <a:t>(10));</a:t>
+            </a:r>
           </a:p>
           <a:p>
             <a:pPr lvl="1">
@@ -27236,24 +27237,199 @@
                 <a:srgbClr val="DF411C"/>
               </a:buClr>
             </a:pPr>
-            <a:endParaRPr lang="en-US" sz="2200" i="1" dirty="0">
-              <a:solidFill>
-                <a:srgbClr val="FF0000"/>
-              </a:solidFill>
-            </a:endParaRPr>
-          </a:p>
-          <a:p>
-            <a:pPr lvl="1">
+            <a:r>
+              <a:rPr lang="en-US" sz="2200" dirty="0"/>
+              <a:t>Explicit wait – max </a:t>
+            </a:r>
+            <a:r>
+              <a:rPr lang="en-US" sz="2200" dirty="0" err="1"/>
+              <a:t>vreme</a:t>
+            </a:r>
+            <a:r>
+              <a:rPr lang="en-US" sz="2200" dirty="0"/>
+              <a:t> </a:t>
+            </a:r>
+            <a:r>
+              <a:rPr lang="en-US" sz="2200" dirty="0" err="1"/>
+              <a:t>čekanja</a:t>
+            </a:r>
+            <a:r>
+              <a:rPr lang="en-US" sz="2200" dirty="0"/>
+              <a:t> da se </a:t>
+            </a:r>
+            <a:r>
+              <a:rPr lang="en-US" sz="2200" dirty="0" err="1"/>
+              <a:t>definisani</a:t>
+            </a:r>
+            <a:r>
+              <a:rPr lang="en-US" sz="2200" dirty="0"/>
+              <a:t> </a:t>
+            </a:r>
+            <a:r>
+              <a:rPr lang="en-US" sz="2200" dirty="0" err="1"/>
+              <a:t>neki</a:t>
+            </a:r>
+            <a:r>
+              <a:rPr lang="en-US" sz="2200" dirty="0"/>
+              <a:t> </a:t>
+            </a:r>
+            <a:r>
+              <a:rPr lang="en-US" sz="2200" dirty="0" err="1"/>
+              <a:t>uslov</a:t>
+            </a:r>
+            <a:r>
+              <a:rPr lang="en-US" sz="2200" dirty="0"/>
+              <a:t> </a:t>
+            </a:r>
+            <a:r>
+              <a:rPr lang="en-US" sz="2200" dirty="0" err="1"/>
+              <a:t>ispuni</a:t>
+            </a:r>
+            <a:br>
+              <a:rPr lang="en-US" sz="2200" i="1" dirty="0">
+                <a:solidFill>
+                  <a:srgbClr val="00B0F0"/>
+                </a:solidFill>
+              </a:rPr>
+            </a:br>
+            <a:r>
+              <a:rPr lang="en-US" sz="2200" i="1" dirty="0">
+                <a:solidFill>
+                  <a:srgbClr val="00B0F0"/>
+                </a:solidFill>
+              </a:rPr>
+              <a:t>	</a:t>
+            </a:r>
+            <a:r>
+              <a:rPr lang="en-US" sz="2200" i="1" dirty="0" err="1">
+                <a:solidFill>
+                  <a:srgbClr val="00B0F0"/>
+                </a:solidFill>
+              </a:rPr>
+              <a:t>WebDriverWait</a:t>
+            </a:r>
+            <a:r>
+              <a:rPr lang="en-US" sz="2200" i="1" dirty="0">
+                <a:solidFill>
+                  <a:srgbClr val="00B0F0"/>
+                </a:solidFill>
+              </a:rPr>
+              <a:t> wait = new </a:t>
+            </a:r>
+            <a:r>
+              <a:rPr lang="en-US" sz="2200" i="1" dirty="0" err="1">
+                <a:solidFill>
+                  <a:srgbClr val="00B0F0"/>
+                </a:solidFill>
+              </a:rPr>
+              <a:t>WebDriverWait</a:t>
+            </a:r>
+            <a:r>
+              <a:rPr lang="en-US" sz="2200" i="1" dirty="0">
+                <a:solidFill>
+                  <a:srgbClr val="00B0F0"/>
+                </a:solidFill>
+              </a:rPr>
+              <a:t>(driver, </a:t>
+            </a:r>
+            <a:r>
+              <a:rPr lang="en-US" sz="2200" i="1" dirty="0" err="1">
+                <a:solidFill>
+                  <a:srgbClr val="00B0F0"/>
+                </a:solidFill>
+              </a:rPr>
+              <a:t>Duration.ofSeconds</a:t>
+            </a:r>
+            <a:r>
+              <a:rPr lang="en-US" sz="2200" i="1" dirty="0">
+                <a:solidFill>
+                  <a:srgbClr val="00B0F0"/>
+                </a:solidFill>
+              </a:rPr>
+              <a:t>(10));</a:t>
+            </a:r>
+          </a:p>
+          <a:p>
+            <a:pPr marL="0" lvl="1" indent="0">
               <a:lnSpc>
                 <a:spcPct val="200000"/>
               </a:lnSpc>
               <a:buClr>
                 <a:srgbClr val="DF411C"/>
               </a:buClr>
+              <a:buNone/>
             </a:pPr>
             <a:r>
-              <a:rPr lang="en-US" sz="2200" dirty="0"/>
-              <a:t>Implicit wait - </a:t>
+              <a:rPr lang="en-US" sz="2200" i="1" dirty="0">
+                <a:solidFill>
+                  <a:srgbClr val="00B0F0"/>
+                </a:solidFill>
+              </a:rPr>
+              <a:t> 	</a:t>
+            </a:r>
+            <a:r>
+              <a:rPr lang="en-US" sz="2200" i="1" dirty="0" err="1">
+                <a:solidFill>
+                  <a:srgbClr val="00B0F0"/>
+                </a:solidFill>
+              </a:rPr>
+              <a:t>wait.until</a:t>
+            </a:r>
+            <a:r>
+              <a:rPr lang="en-US" sz="2200" i="1" dirty="0">
+                <a:solidFill>
+                  <a:srgbClr val="00B0F0"/>
+                </a:solidFill>
+              </a:rPr>
+              <a:t>(</a:t>
+            </a:r>
+            <a:r>
+              <a:rPr lang="en-US" sz="2200" i="1" dirty="0" err="1">
+                <a:solidFill>
+                  <a:srgbClr val="00B0F0"/>
+                </a:solidFill>
+              </a:rPr>
+              <a:t>ExpectedConditions.elementToBeClickable</a:t>
+            </a:r>
+            <a:r>
+              <a:rPr lang="en-US" sz="2200" i="1" dirty="0">
+                <a:solidFill>
+                  <a:srgbClr val="00B0F0"/>
+                </a:solidFill>
+              </a:rPr>
+              <a:t>(</a:t>
+            </a:r>
+            <a:r>
+              <a:rPr lang="en-US" sz="2200" i="1" dirty="0" err="1">
+                <a:solidFill>
+                  <a:srgbClr val="00B0F0"/>
+                </a:solidFill>
+              </a:rPr>
+              <a:t>By.id</a:t>
+            </a:r>
+            <a:r>
+              <a:rPr lang="en-US" sz="2200" i="1" dirty="0">
+                <a:solidFill>
+                  <a:srgbClr val="00B0F0"/>
+                </a:solidFill>
+              </a:rPr>
+              <a:t>(&lt;</a:t>
+            </a:r>
+            <a:r>
+              <a:rPr lang="en-US" sz="2200" i="1" dirty="0" err="1">
+                <a:solidFill>
+                  <a:srgbClr val="00B0F0"/>
+                </a:solidFill>
+              </a:rPr>
+              <a:t>someid</a:t>
+            </a:r>
+            <a:r>
+              <a:rPr lang="en-US" sz="2200" i="1" dirty="0">
+                <a:solidFill>
+                  <a:srgbClr val="00B0F0"/>
+                </a:solidFill>
+              </a:rPr>
+              <a:t>&gt;)));</a:t>
             </a:r>
           </a:p>
           <a:p>
@@ -27266,125 +27442,11 @@
               </a:buClr>
               <a:buNone/>
             </a:pPr>
-            <a:r>
-              <a:rPr lang="en-US" sz="2200" i="1" dirty="0">
-                <a:solidFill>
-                  <a:srgbClr val="00B050"/>
-                </a:solidFill>
-              </a:rPr>
-              <a:t>Selenium 3 - </a:t>
-            </a:r>
-            <a:r>
-              <a:rPr lang="en-US" sz="2200" i="1" dirty="0" err="1">
-                <a:solidFill>
-                  <a:srgbClr val="00B050"/>
-                </a:solidFill>
-              </a:rPr>
-              <a:t>driver.manage</a:t>
-            </a:r>
-            <a:r>
-              <a:rPr lang="en-US" sz="2200" i="1" dirty="0">
-                <a:solidFill>
-                  <a:srgbClr val="00B050"/>
-                </a:solidFill>
-              </a:rPr>
-              <a:t>().timeouts().</a:t>
-            </a:r>
-            <a:r>
-              <a:rPr lang="en-US" sz="2200" i="1" dirty="0" err="1">
-                <a:solidFill>
-                  <a:srgbClr val="00B050"/>
-                </a:solidFill>
-              </a:rPr>
-              <a:t>implicitlyWait</a:t>
-            </a:r>
-            <a:r>
-              <a:rPr lang="en-US" sz="2200" i="1" dirty="0">
-                <a:solidFill>
-                  <a:srgbClr val="00B050"/>
-                </a:solidFill>
-              </a:rPr>
-              <a:t>(10, </a:t>
-            </a:r>
-            <a:r>
-              <a:rPr lang="en-US" sz="2200" i="1" dirty="0" err="1">
-                <a:solidFill>
-                  <a:srgbClr val="00B050"/>
-                </a:solidFill>
-              </a:rPr>
-              <a:t>TimeUnit.SECONDS</a:t>
-            </a:r>
-            <a:r>
-              <a:rPr lang="en-US" sz="2200" i="1" dirty="0">
-                <a:solidFill>
-                  <a:srgbClr val="00B050"/>
-                </a:solidFill>
-              </a:rPr>
-              <a:t>);</a:t>
-            </a:r>
-            <a:br>
-              <a:rPr lang="en-US" sz="2200" i="1" dirty="0">
-                <a:solidFill>
-                  <a:srgbClr val="00B050"/>
-                </a:solidFill>
-              </a:rPr>
-            </a:br>
-            <a:r>
-              <a:rPr lang="en-US" sz="2200" i="1" dirty="0">
-                <a:solidFill>
-                  <a:srgbClr val="00B0F0"/>
-                </a:solidFill>
-              </a:rPr>
-              <a:t>Selenium 4 - </a:t>
-            </a:r>
-            <a:r>
-              <a:rPr lang="en-US" sz="2200" i="1" dirty="0" err="1">
-                <a:solidFill>
-                  <a:srgbClr val="00B0F0"/>
-                </a:solidFill>
-              </a:rPr>
-              <a:t>driver.manage</a:t>
-            </a:r>
-            <a:r>
-              <a:rPr lang="en-US" sz="2200" i="1" dirty="0">
-                <a:solidFill>
-                  <a:srgbClr val="00B0F0"/>
-                </a:solidFill>
-              </a:rPr>
-              <a:t>().timeouts().</a:t>
-            </a:r>
-            <a:r>
-              <a:rPr lang="en-US" sz="2200" i="1" dirty="0" err="1">
-                <a:solidFill>
-                  <a:srgbClr val="00B0F0"/>
-                </a:solidFill>
-              </a:rPr>
-              <a:t>implicitlyWait</a:t>
-            </a:r>
-            <a:r>
-              <a:rPr lang="en-US" sz="2200" i="1" dirty="0">
-                <a:solidFill>
-                  <a:srgbClr val="00B0F0"/>
-                </a:solidFill>
-              </a:rPr>
-              <a:t>(</a:t>
-            </a:r>
-            <a:r>
-              <a:rPr lang="en-US" sz="2200" i="1" dirty="0" err="1">
-                <a:solidFill>
-                  <a:srgbClr val="00B0F0"/>
-                </a:solidFill>
-              </a:rPr>
-              <a:t>Duration.ofSeconds</a:t>
-            </a:r>
-            <a:r>
-              <a:rPr lang="en-US" sz="2200" i="1" dirty="0">
-                <a:solidFill>
-                  <a:srgbClr val="00B0F0"/>
-                </a:solidFill>
-              </a:rPr>
-              <a:t>(10));</a:t>
-            </a:r>
+            <a:endParaRPr lang="en-US" sz="2200" i="1" dirty="0">
+              <a:solidFill>
+                <a:srgbClr val="00B0F0"/>
+              </a:solidFill>
+            </a:endParaRPr>
           </a:p>
           <a:p>
             <a:pPr marL="0" lvl="1" indent="0">
@@ -27446,7 +27508,7 @@
                                         <p:tgtEl>
                                           <p:spTgt spid="5">
                                             <p:txEl>
-                                              <p:pRg st="1" end="1"/>
+                                              <p:pRg st="0" end="0"/>
                                             </p:txEl>
                                           </p:spTgt>
                                         </p:tgtEl>
@@ -27495,7 +27557,7 @@
                                         <p:tgtEl>
                                           <p:spTgt spid="5">
                                             <p:txEl>
-                                              <p:pRg st="3" end="3"/>
+                                              <p:pRg st="1" end="1"/>
                                             </p:txEl>
                                           </p:spTgt>
                                         </p:tgtEl>
@@ -27537,6 +27599,104 @@
                                     <p:set>
                                       <p:cBhvr>
                                         <p:cTn id="14" dur="1" fill="hold">
+                                          <p:stCondLst>
+                                            <p:cond delay="0"/>
+                                          </p:stCondLst>
+                                        </p:cTn>
+                                        <p:tgtEl>
+                                          <p:spTgt spid="5">
+                                            <p:txEl>
+                                              <p:pRg st="2" end="2"/>
+                                            </p:txEl>
+                                          </p:spTgt>
+                                        </p:tgtEl>
+                                        <p:attrNameLst>
+                                          <p:attrName>style.visibility</p:attrName>
+                                        </p:attrNameLst>
+                                      </p:cBhvr>
+                                      <p:to>
+                                        <p:strVal val="visible"/>
+                                      </p:to>
+                                    </p:set>
+                                  </p:childTnLst>
+                                </p:cTn>
+                              </p:par>
+                            </p:childTnLst>
+                          </p:cTn>
+                        </p:par>
+                      </p:childTnLst>
+                    </p:cTn>
+                  </p:par>
+                  <p:par>
+                    <p:cTn id="15" fill="hold">
+                      <p:stCondLst>
+                        <p:cond delay="indefinite"/>
+                      </p:stCondLst>
+                      <p:childTnLst>
+                        <p:par>
+                          <p:cTn id="16" fill="hold">
+                            <p:stCondLst>
+                              <p:cond delay="0"/>
+                            </p:stCondLst>
+                            <p:childTnLst>
+                              <p:par>
+                                <p:cTn id="17" presetID="1" presetClass="entr" presetSubtype="0" fill="hold" nodeType="clickEffect">
+                                  <p:stCondLst>
+                                    <p:cond delay="0"/>
+                                  </p:stCondLst>
+                                  <p:childTnLst>
+                                    <p:set>
+                                      <p:cBhvr>
+                                        <p:cTn id="18" dur="1" fill="hold">
+                                          <p:stCondLst>
+                                            <p:cond delay="0"/>
+                                          </p:stCondLst>
+                                        </p:cTn>
+                                        <p:tgtEl>
+                                          <p:spTgt spid="5">
+                                            <p:txEl>
+                                              <p:pRg st="3" end="3"/>
+                                            </p:txEl>
+                                          </p:spTgt>
+                                        </p:tgtEl>
+                                        <p:attrNameLst>
+                                          <p:attrName>style.visibility</p:attrName>
+                                        </p:attrNameLst>
+                                      </p:cBhvr>
+                                      <p:to>
+                                        <p:strVal val="visible"/>
+                                      </p:to>
+                                    </p:set>
+                                  </p:childTnLst>
+                                </p:cTn>
+                              </p:par>
+                            </p:childTnLst>
+                          </p:cTn>
+                        </p:par>
+                      </p:childTnLst>
+                    </p:cTn>
+                  </p:par>
+                  <p:par>
+                    <p:cTn id="19" fill="hold">
+                      <p:stCondLst>
+                        <p:cond delay="indefinite"/>
+                      </p:stCondLst>
+                      <p:childTnLst>
+                        <p:par>
+                          <p:cTn id="20" fill="hold">
+                            <p:stCondLst>
+                              <p:cond delay="0"/>
+                            </p:stCondLst>
+                            <p:childTnLst>
+                              <p:par>
+                                <p:cTn id="21" presetID="1" presetClass="entr" presetSubtype="0" fill="hold" nodeType="clickEffect">
+                                  <p:stCondLst>
+                                    <p:cond delay="0"/>
+                                  </p:stCondLst>
+                                  <p:childTnLst>
+                                    <p:set>
+                                      <p:cBhvr>
+                                        <p:cTn id="22" dur="1" fill="hold">
                                           <p:stCondLst>
                                             <p:cond delay="0"/>
                                           </p:stCondLst>
@@ -27609,1417 +27769,6 @@
       </p:grpSpPr>
       <p:sp>
         <p:nvSpPr>
-          <p:cNvPr id="6" name="Title 1"/>
-          <p:cNvSpPr>
-            <a:spLocks noGrp="1"/>
-          </p:cNvSpPr>
-          <p:nvPr>
-            <p:ph type="title"/>
-          </p:nvPr>
-        </p:nvSpPr>
-        <p:spPr>
-          <a:xfrm>
-            <a:off x="539206" y="172608"/>
-            <a:ext cx="11113588" cy="1025980"/>
-          </a:xfrm>
-        </p:spPr>
-        <p:txBody>
-          <a:bodyPr>
-            <a:normAutofit/>
-          </a:bodyPr>
-          <a:lstStyle/>
-          <a:p>
-            <a:r>
-              <a:rPr lang="en-US"/>
-              <a:t>PROBLEMI PRI LOCIRANJU ELEMENATA – WAIT KOMANDE</a:t>
-            </a:r>
-          </a:p>
-        </p:txBody>
-      </p:sp>
-      <p:sp>
-        <p:nvSpPr>
-          <p:cNvPr id="5" name="Content Placeholder 4">
-            <a:extLst>
-              <a:ext uri="{FF2B5EF4-FFF2-40B4-BE49-F238E27FC236}">
-                <a16:creationId xmlns:a16="http://schemas.microsoft.com/office/drawing/2014/main" id="{90CB7C99-F337-4CFD-AA95-122E832BBF37}"/>
-              </a:ext>
-            </a:extLst>
-          </p:cNvPr>
-          <p:cNvSpPr txBox="1">
-            <a:spLocks/>
-          </p:cNvSpPr>
-          <p:nvPr/>
-        </p:nvSpPr>
-        <p:spPr>
-          <a:xfrm>
-            <a:off x="1091866" y="1383019"/>
-            <a:ext cx="10346198" cy="6309484"/>
-          </a:xfrm>
-          <a:prstGeom prst="rect">
-            <a:avLst/>
-          </a:prstGeom>
-        </p:spPr>
-        <p:txBody>
-          <a:bodyPr vert="horz" wrap="square" lIns="0" tIns="0" rIns="0" bIns="0" rtlCol="0">
-            <a:spAutoFit/>
-          </a:bodyPr>
-          <a:lstStyle>
-            <a:lvl1pPr marL="0" marR="0" indent="0" algn="l" defTabSz="914400" rtl="0" eaLnBrk="1" fontAlgn="auto" latinLnBrk="0" hangingPunct="1">
-              <a:lnSpc>
-                <a:spcPct val="100000"/>
-              </a:lnSpc>
-              <a:spcBef>
-                <a:spcPts val="1000"/>
-              </a:spcBef>
-              <a:spcAft>
-                <a:spcPts val="0"/>
-              </a:spcAft>
-              <a:buClrTx/>
-              <a:buSzTx/>
-              <a:buFontTx/>
-              <a:buNone/>
-              <a:tabLst/>
-              <a:defRPr lang="en-US" sz="1600" b="0" kern="1200" cap="none" baseline="0" dirty="0" smtClean="0">
-                <a:solidFill>
-                  <a:schemeClr val="tx1"/>
-                </a:solidFill>
-                <a:latin typeface="Arial" panose="020B0604020202020204" pitchFamily="34" charset="0"/>
-                <a:ea typeface="Arial" panose="020B0604020202020204" pitchFamily="34" charset="0"/>
-                <a:cs typeface="Arial" panose="020B0604020202020204" pitchFamily="34" charset="0"/>
-              </a:defRPr>
-            </a:lvl1pPr>
-            <a:lvl2pPr marL="285750" indent="-285750" algn="l" defTabSz="914400" rtl="0" eaLnBrk="1" latinLnBrk="0" hangingPunct="1">
-              <a:lnSpc>
-                <a:spcPct val="90000"/>
-              </a:lnSpc>
-              <a:spcBef>
-                <a:spcPts val="500"/>
-              </a:spcBef>
-              <a:buClr>
-                <a:srgbClr val="DE411B"/>
-              </a:buClr>
-              <a:buFont typeface="Wingdings" panose="05000000000000000000" pitchFamily="2" charset="2"/>
-              <a:buChar char="§"/>
-              <a:defRPr sz="1600" kern="1200">
-                <a:solidFill>
-                  <a:schemeClr val="tx1"/>
-                </a:solidFill>
-                <a:latin typeface="+mn-lt"/>
-                <a:ea typeface="+mn-ea"/>
-                <a:cs typeface="+mn-cs"/>
-              </a:defRPr>
-            </a:lvl2pPr>
-            <a:lvl3pPr marL="914400" indent="0" algn="l" defTabSz="914400" rtl="0" eaLnBrk="1" latinLnBrk="0" hangingPunct="1">
-              <a:lnSpc>
-                <a:spcPct val="90000"/>
-              </a:lnSpc>
-              <a:spcBef>
-                <a:spcPts val="500"/>
-              </a:spcBef>
-              <a:buClr>
-                <a:srgbClr val="81ADB5"/>
-              </a:buClr>
-              <a:buFontTx/>
-              <a:buNone/>
-              <a:defRPr sz="1600" kern="1200">
-                <a:solidFill>
-                  <a:schemeClr val="tx1"/>
-                </a:solidFill>
-                <a:latin typeface="+mn-lt"/>
-                <a:ea typeface="+mn-ea"/>
-                <a:cs typeface="+mn-cs"/>
-              </a:defRPr>
-            </a:lvl3pPr>
-            <a:lvl4pPr marL="1371600" indent="0" algn="l" defTabSz="914400" rtl="0" eaLnBrk="1" latinLnBrk="0" hangingPunct="1">
-              <a:lnSpc>
-                <a:spcPct val="90000"/>
-              </a:lnSpc>
-              <a:spcBef>
-                <a:spcPts val="500"/>
-              </a:spcBef>
-              <a:buFontTx/>
-              <a:buNone/>
-              <a:defRPr sz="1500" kern="1200">
-                <a:solidFill>
-                  <a:schemeClr val="tx1"/>
-                </a:solidFill>
-                <a:latin typeface="+mn-lt"/>
-                <a:ea typeface="+mn-ea"/>
-                <a:cs typeface="+mn-cs"/>
-              </a:defRPr>
-            </a:lvl4pPr>
-            <a:lvl5pPr marL="1828800" indent="0" algn="l" defTabSz="914400" rtl="0" eaLnBrk="1" latinLnBrk="0" hangingPunct="1">
-              <a:lnSpc>
-                <a:spcPct val="90000"/>
-              </a:lnSpc>
-              <a:spcBef>
-                <a:spcPts val="500"/>
-              </a:spcBef>
-              <a:buFontTx/>
-              <a:buNone/>
-              <a:defRPr sz="1400" kern="1200">
-                <a:solidFill>
-                  <a:schemeClr val="tx1"/>
-                </a:solidFill>
-                <a:latin typeface="+mn-lt"/>
-                <a:ea typeface="+mn-ea"/>
-                <a:cs typeface="+mn-cs"/>
-              </a:defRPr>
-            </a:lvl5pPr>
-            <a:lvl6pPr marL="2514600" indent="-228600" algn="l" defTabSz="914400" rtl="0" eaLnBrk="1" latinLnBrk="0" hangingPunct="1">
-              <a:lnSpc>
-                <a:spcPct val="90000"/>
-              </a:lnSpc>
-              <a:spcBef>
-                <a:spcPts val="500"/>
-              </a:spcBef>
-              <a:buFont typeface="Arial" panose="020B0604020202020204" pitchFamily="34" charset="0"/>
-              <a:buChar char="•"/>
-              <a:defRPr sz="1800" kern="1200">
-                <a:solidFill>
-                  <a:schemeClr val="tx1"/>
-                </a:solidFill>
-                <a:latin typeface="+mn-lt"/>
-                <a:ea typeface="+mn-ea"/>
-                <a:cs typeface="+mn-cs"/>
-              </a:defRPr>
-            </a:lvl6pPr>
-            <a:lvl7pPr marL="2971800" indent="-228600" algn="l" defTabSz="914400" rtl="0" eaLnBrk="1" latinLnBrk="0" hangingPunct="1">
-              <a:lnSpc>
-                <a:spcPct val="90000"/>
-              </a:lnSpc>
-              <a:spcBef>
-                <a:spcPts val="500"/>
-              </a:spcBef>
-              <a:buFont typeface="Arial" panose="020B0604020202020204" pitchFamily="34" charset="0"/>
-              <a:buChar char="•"/>
-              <a:defRPr sz="1800" kern="1200">
-                <a:solidFill>
-                  <a:schemeClr val="tx1"/>
-                </a:solidFill>
-                <a:latin typeface="+mn-lt"/>
-                <a:ea typeface="+mn-ea"/>
-                <a:cs typeface="+mn-cs"/>
-              </a:defRPr>
-            </a:lvl7pPr>
-            <a:lvl8pPr marL="3429000" indent="-228600" algn="l" defTabSz="914400" rtl="0" eaLnBrk="1" latinLnBrk="0" hangingPunct="1">
-              <a:lnSpc>
-                <a:spcPct val="90000"/>
-              </a:lnSpc>
-              <a:spcBef>
-                <a:spcPts val="500"/>
-              </a:spcBef>
-              <a:buFont typeface="Arial" panose="020B0604020202020204" pitchFamily="34" charset="0"/>
-              <a:buChar char="•"/>
-              <a:defRPr sz="1800" kern="1200">
-                <a:solidFill>
-                  <a:schemeClr val="tx1"/>
-                </a:solidFill>
-                <a:latin typeface="+mn-lt"/>
-                <a:ea typeface="+mn-ea"/>
-                <a:cs typeface="+mn-cs"/>
-              </a:defRPr>
-            </a:lvl8pPr>
-            <a:lvl9pPr marL="3886200" indent="-228600" algn="l" defTabSz="914400" rtl="0" eaLnBrk="1" latinLnBrk="0" hangingPunct="1">
-              <a:lnSpc>
-                <a:spcPct val="90000"/>
-              </a:lnSpc>
-              <a:spcBef>
-                <a:spcPts val="500"/>
-              </a:spcBef>
-              <a:buFont typeface="Arial" panose="020B0604020202020204" pitchFamily="34" charset="0"/>
-              <a:buChar char="•"/>
-              <a:defRPr sz="1800" kern="1200">
-                <a:solidFill>
-                  <a:schemeClr val="tx1"/>
-                </a:solidFill>
-                <a:latin typeface="+mn-lt"/>
-                <a:ea typeface="+mn-ea"/>
-                <a:cs typeface="+mn-cs"/>
-              </a:defRPr>
-            </a:lvl9pPr>
-          </a:lstStyle>
-          <a:p>
-            <a:pPr lvl="1">
-              <a:lnSpc>
-                <a:spcPct val="200000"/>
-              </a:lnSpc>
-              <a:buClr>
-                <a:srgbClr val="DF411C"/>
-              </a:buClr>
-            </a:pPr>
-            <a:r>
-              <a:rPr lang="en-US" sz="2200" dirty="0"/>
-              <a:t>Explicit wait - </a:t>
-            </a:r>
-            <a:r>
-              <a:rPr lang="en-US" sz="2200" dirty="0" err="1"/>
-              <a:t>WebDriverWait</a:t>
-            </a:r>
-            <a:endParaRPr lang="en-US" sz="2200" dirty="0"/>
-          </a:p>
-          <a:p>
-            <a:pPr marL="0" lvl="1" indent="0">
-              <a:lnSpc>
-                <a:spcPct val="200000"/>
-              </a:lnSpc>
-              <a:buClr>
-                <a:srgbClr val="DF411C"/>
-              </a:buClr>
-              <a:buNone/>
-            </a:pPr>
-            <a:r>
-              <a:rPr lang="en-US" sz="2200" i="1" dirty="0">
-                <a:solidFill>
-                  <a:srgbClr val="00B050"/>
-                </a:solidFill>
-              </a:rPr>
-              <a:t>Selenium3 – </a:t>
-            </a:r>
-            <a:br>
-              <a:rPr lang="en-US" sz="2200" i="1" dirty="0">
-                <a:solidFill>
-                  <a:srgbClr val="00B050"/>
-                </a:solidFill>
-              </a:rPr>
-            </a:br>
-            <a:r>
-              <a:rPr lang="en-US" sz="2200" i="1" dirty="0" err="1">
-                <a:solidFill>
-                  <a:srgbClr val="00B050"/>
-                </a:solidFill>
-              </a:rPr>
-              <a:t>WebDriverWait</a:t>
-            </a:r>
-            <a:r>
-              <a:rPr lang="en-US" sz="2200" i="1" dirty="0">
-                <a:solidFill>
-                  <a:srgbClr val="00B050"/>
-                </a:solidFill>
-              </a:rPr>
-              <a:t> wait = new </a:t>
-            </a:r>
-            <a:r>
-              <a:rPr lang="en-US" sz="2200" i="1" dirty="0" err="1">
-                <a:solidFill>
-                  <a:srgbClr val="00B050"/>
-                </a:solidFill>
-              </a:rPr>
-              <a:t>WebDriverWait</a:t>
-            </a:r>
-            <a:r>
-              <a:rPr lang="en-US" sz="2200" i="1" dirty="0">
-                <a:solidFill>
-                  <a:srgbClr val="00B050"/>
-                </a:solidFill>
-              </a:rPr>
-              <a:t>(driver, 10);</a:t>
-            </a:r>
-          </a:p>
-          <a:p>
-            <a:pPr marL="0" lvl="1" indent="0">
-              <a:lnSpc>
-                <a:spcPct val="200000"/>
-              </a:lnSpc>
-              <a:buClr>
-                <a:srgbClr val="DF411C"/>
-              </a:buClr>
-              <a:buNone/>
-            </a:pPr>
-            <a:r>
-              <a:rPr lang="en-US" sz="2200" i="1" dirty="0" err="1">
-                <a:solidFill>
-                  <a:srgbClr val="00B050"/>
-                </a:solidFill>
-              </a:rPr>
-              <a:t>wait.until</a:t>
-            </a:r>
-            <a:r>
-              <a:rPr lang="en-US" sz="2200" i="1" dirty="0">
-                <a:solidFill>
-                  <a:srgbClr val="00B050"/>
-                </a:solidFill>
-              </a:rPr>
-              <a:t>(</a:t>
-            </a:r>
-            <a:r>
-              <a:rPr lang="en-US" sz="2200" i="1" dirty="0" err="1">
-                <a:solidFill>
-                  <a:srgbClr val="00B050"/>
-                </a:solidFill>
-              </a:rPr>
-              <a:t>ExpectedConditions.elementToBeClickable</a:t>
-            </a:r>
-            <a:r>
-              <a:rPr lang="en-US" sz="2200" i="1" dirty="0">
-                <a:solidFill>
-                  <a:srgbClr val="00B050"/>
-                </a:solidFill>
-              </a:rPr>
-              <a:t>(By.id(&lt;</a:t>
-            </a:r>
-            <a:r>
-              <a:rPr lang="en-US" sz="2200" i="1" dirty="0" err="1">
-                <a:solidFill>
-                  <a:srgbClr val="00B050"/>
-                </a:solidFill>
-              </a:rPr>
-              <a:t>someid</a:t>
-            </a:r>
-            <a:r>
-              <a:rPr lang="en-US" sz="2200" i="1" dirty="0">
-                <a:solidFill>
-                  <a:srgbClr val="00B050"/>
-                </a:solidFill>
-              </a:rPr>
-              <a:t>&gt;)));</a:t>
-            </a:r>
-            <a:br>
-              <a:rPr lang="en-US" sz="2200" i="1" dirty="0">
-                <a:solidFill>
-                  <a:srgbClr val="00B0F0"/>
-                </a:solidFill>
-              </a:rPr>
-            </a:br>
-            <a:r>
-              <a:rPr lang="en-US" sz="2200" i="1" dirty="0">
-                <a:solidFill>
-                  <a:srgbClr val="00B0F0"/>
-                </a:solidFill>
-              </a:rPr>
-              <a:t>Selenium4 – </a:t>
-            </a:r>
-            <a:br>
-              <a:rPr lang="en-US" sz="2200" i="1" dirty="0">
-                <a:solidFill>
-                  <a:srgbClr val="00B0F0"/>
-                </a:solidFill>
-              </a:rPr>
-            </a:br>
-            <a:r>
-              <a:rPr lang="en-US" sz="2200" i="1" dirty="0" err="1">
-                <a:solidFill>
-                  <a:srgbClr val="00B0F0"/>
-                </a:solidFill>
-              </a:rPr>
-              <a:t>WebDriverWait</a:t>
-            </a:r>
-            <a:r>
-              <a:rPr lang="en-US" sz="2200" i="1" dirty="0">
-                <a:solidFill>
-                  <a:srgbClr val="00B0F0"/>
-                </a:solidFill>
-              </a:rPr>
-              <a:t> wait = new </a:t>
-            </a:r>
-            <a:r>
-              <a:rPr lang="en-US" sz="2200" i="1" dirty="0" err="1">
-                <a:solidFill>
-                  <a:srgbClr val="00B0F0"/>
-                </a:solidFill>
-              </a:rPr>
-              <a:t>WebDriverWait</a:t>
-            </a:r>
-            <a:r>
-              <a:rPr lang="en-US" sz="2200" i="1" dirty="0">
-                <a:solidFill>
-                  <a:srgbClr val="00B0F0"/>
-                </a:solidFill>
-              </a:rPr>
-              <a:t>(driver, </a:t>
-            </a:r>
-            <a:r>
-              <a:rPr lang="en-US" sz="2200" i="1" dirty="0" err="1">
-                <a:solidFill>
-                  <a:srgbClr val="00B0F0"/>
-                </a:solidFill>
-              </a:rPr>
-              <a:t>Duration.ofSeconds</a:t>
-            </a:r>
-            <a:r>
-              <a:rPr lang="en-US" sz="2200" i="1" dirty="0">
-                <a:solidFill>
-                  <a:srgbClr val="00B0F0"/>
-                </a:solidFill>
-              </a:rPr>
-              <a:t>(10));</a:t>
-            </a:r>
-          </a:p>
-          <a:p>
-            <a:pPr marL="0" lvl="1" indent="0">
-              <a:lnSpc>
-                <a:spcPct val="200000"/>
-              </a:lnSpc>
-              <a:buClr>
-                <a:srgbClr val="DF411C"/>
-              </a:buClr>
-              <a:buNone/>
-            </a:pPr>
-            <a:r>
-              <a:rPr lang="en-US" sz="2200" i="1" dirty="0" err="1">
-                <a:solidFill>
-                  <a:srgbClr val="00B0F0"/>
-                </a:solidFill>
-              </a:rPr>
-              <a:t>wait.until</a:t>
-            </a:r>
-            <a:r>
-              <a:rPr lang="en-US" sz="2200" i="1" dirty="0">
-                <a:solidFill>
-                  <a:srgbClr val="00B0F0"/>
-                </a:solidFill>
-              </a:rPr>
-              <a:t>(</a:t>
-            </a:r>
-            <a:r>
-              <a:rPr lang="en-US" sz="2200" i="1" dirty="0" err="1">
-                <a:solidFill>
-                  <a:srgbClr val="00B0F0"/>
-                </a:solidFill>
-              </a:rPr>
-              <a:t>ExpectedConditions.elementToBeClickable</a:t>
-            </a:r>
-            <a:r>
-              <a:rPr lang="en-US" sz="2200" i="1" dirty="0">
-                <a:solidFill>
-                  <a:srgbClr val="00B0F0"/>
-                </a:solidFill>
-              </a:rPr>
-              <a:t>(By.id(&lt;</a:t>
-            </a:r>
-            <a:r>
-              <a:rPr lang="en-US" sz="2200" i="1" dirty="0" err="1">
-                <a:solidFill>
-                  <a:srgbClr val="00B0F0"/>
-                </a:solidFill>
-              </a:rPr>
-              <a:t>someid</a:t>
-            </a:r>
-            <a:r>
-              <a:rPr lang="en-US" sz="2200" i="1" dirty="0">
-                <a:solidFill>
-                  <a:srgbClr val="00B0F0"/>
-                </a:solidFill>
-              </a:rPr>
-              <a:t>&gt;)));</a:t>
-            </a:r>
-          </a:p>
-          <a:p>
-            <a:pPr marL="0" lvl="1" indent="0">
-              <a:lnSpc>
-                <a:spcPct val="200000"/>
-              </a:lnSpc>
-              <a:buClr>
-                <a:srgbClr val="DF411C"/>
-              </a:buClr>
-              <a:buNone/>
-            </a:pPr>
-            <a:endParaRPr lang="en-US" sz="2200" i="1" dirty="0">
-              <a:solidFill>
-                <a:srgbClr val="00B0F0"/>
-              </a:solidFill>
-            </a:endParaRPr>
-          </a:p>
-          <a:p>
-            <a:pPr lvl="1">
-              <a:lnSpc>
-                <a:spcPct val="200000"/>
-              </a:lnSpc>
-              <a:buClr>
-                <a:srgbClr val="DF411C"/>
-              </a:buClr>
-            </a:pPr>
-            <a:endParaRPr lang="en-US" sz="2200" dirty="0"/>
-          </a:p>
-        </p:txBody>
-      </p:sp>
-    </p:spTree>
-    <p:extLst>
-      <p:ext uri="{BB962C8B-B14F-4D97-AF65-F5344CB8AC3E}">
-        <p14:creationId xmlns:p14="http://schemas.microsoft.com/office/powerpoint/2010/main" val="307935734"/>
-      </p:ext>
-    </p:extLst>
-  </p:cSld>
-  <p:clrMapOvr>
-    <a:masterClrMapping/>
-  </p:clrMapOvr>
-  <p:timing>
-    <p:tnLst>
-      <p:par>
-        <p:cTn id="1" dur="indefinite" restart="never" nodeType="tmRoot">
-          <p:childTnLst>
-            <p:seq concurrent="1" nextAc="seek">
-              <p:cTn id="2" dur="indefinite" nodeType="mainSeq">
-                <p:childTnLst>
-                  <p:par>
-                    <p:cTn id="3" fill="hold">
-                      <p:stCondLst>
-                        <p:cond delay="indefinite"/>
-                      </p:stCondLst>
-                      <p:childTnLst>
-                        <p:par>
-                          <p:cTn id="4" fill="hold">
-                            <p:stCondLst>
-                              <p:cond delay="0"/>
-                            </p:stCondLst>
-                            <p:childTnLst>
-                              <p:par>
-                                <p:cTn id="5" presetID="1" presetClass="entr" presetSubtype="0" fill="hold" grpId="0" nodeType="clickEffect">
-                                  <p:stCondLst>
-                                    <p:cond delay="0"/>
-                                  </p:stCondLst>
-                                  <p:childTnLst>
-                                    <p:set>
-                                      <p:cBhvr>
-                                        <p:cTn id="6" dur="1" fill="hold">
-                                          <p:stCondLst>
-                                            <p:cond delay="0"/>
-                                          </p:stCondLst>
-                                        </p:cTn>
-                                        <p:tgtEl>
-                                          <p:spTgt spid="5"/>
-                                        </p:tgtEl>
-                                        <p:attrNameLst>
-                                          <p:attrName>style.visibility</p:attrName>
-                                        </p:attrNameLst>
-                                      </p:cBhvr>
-                                      <p:to>
-                                        <p:strVal val="visible"/>
-                                      </p:to>
-                                    </p:set>
-                                  </p:childTnLst>
-                                </p:cTn>
-                              </p:par>
-                            </p:childTnLst>
-                          </p:cTn>
-                        </p:par>
-                      </p:childTnLst>
-                    </p:cTn>
-                  </p:par>
-                  <p:par>
-                    <p:cTn id="7" fill="hold">
-                      <p:stCondLst>
-                        <p:cond delay="indefinite"/>
-                      </p:stCondLst>
-                      <p:childTnLst>
-                        <p:par>
-                          <p:cTn id="8" fill="hold">
-                            <p:stCondLst>
-                              <p:cond delay="0"/>
-                            </p:stCondLst>
-                            <p:childTnLst>
-                              <p:par>
-                                <p:cTn id="9" presetID="1" presetClass="entr" presetSubtype="0" fill="hold" nodeType="clickEffect">
-                                  <p:stCondLst>
-                                    <p:cond delay="0"/>
-                                  </p:stCondLst>
-                                  <p:childTnLst>
-                                    <p:set>
-                                      <p:cBhvr>
-                                        <p:cTn id="10" dur="1" fill="hold">
-                                          <p:stCondLst>
-                                            <p:cond delay="0"/>
-                                          </p:stCondLst>
-                                        </p:cTn>
-                                        <p:tgtEl>
-                                          <p:spTgt spid="5">
-                                            <p:txEl>
-                                              <p:pRg st="1" end="1"/>
-                                            </p:txEl>
-                                          </p:spTgt>
-                                        </p:tgtEl>
-                                        <p:attrNameLst>
-                                          <p:attrName>style.visibility</p:attrName>
-                                        </p:attrNameLst>
-                                      </p:cBhvr>
-                                      <p:to>
-                                        <p:strVal val="visible"/>
-                                      </p:to>
-                                    </p:set>
-                                  </p:childTnLst>
-                                </p:cTn>
-                              </p:par>
-                              <p:par>
-                                <p:cTn id="11" presetID="1" presetClass="entr" presetSubtype="0" fill="hold" nodeType="withEffect">
-                                  <p:stCondLst>
-                                    <p:cond delay="0"/>
-                                  </p:stCondLst>
-                                  <p:childTnLst>
-                                    <p:set>
-                                      <p:cBhvr>
-                                        <p:cTn id="12" dur="1" fill="hold">
-                                          <p:stCondLst>
-                                            <p:cond delay="0"/>
-                                          </p:stCondLst>
-                                        </p:cTn>
-                                        <p:tgtEl>
-                                          <p:spTgt spid="5">
-                                            <p:txEl>
-                                              <p:pRg st="2" end="2"/>
-                                            </p:txEl>
-                                          </p:spTgt>
-                                        </p:tgtEl>
-                                        <p:attrNameLst>
-                                          <p:attrName>style.visibility</p:attrName>
-                                        </p:attrNameLst>
-                                      </p:cBhvr>
-                                      <p:to>
-                                        <p:strVal val="visible"/>
-                                      </p:to>
-                                    </p:set>
-                                  </p:childTnLst>
-                                </p:cTn>
-                              </p:par>
-                              <p:par>
-                                <p:cTn id="13" presetID="1" presetClass="entr" presetSubtype="0" fill="hold" nodeType="withEffect">
-                                  <p:stCondLst>
-                                    <p:cond delay="0"/>
-                                  </p:stCondLst>
-                                  <p:childTnLst>
-                                    <p:set>
-                                      <p:cBhvr>
-                                        <p:cTn id="14" dur="1" fill="hold">
-                                          <p:stCondLst>
-                                            <p:cond delay="0"/>
-                                          </p:stCondLst>
-                                        </p:cTn>
-                                        <p:tgtEl>
-                                          <p:spTgt spid="5">
-                                            <p:txEl>
-                                              <p:pRg st="3" end="3"/>
-                                            </p:txEl>
-                                          </p:spTgt>
-                                        </p:tgtEl>
-                                        <p:attrNameLst>
-                                          <p:attrName>style.visibility</p:attrName>
-                                        </p:attrNameLst>
-                                      </p:cBhvr>
-                                      <p:to>
-                                        <p:strVal val="visible"/>
-                                      </p:to>
-                                    </p:set>
-                                  </p:childTnLst>
-                                </p:cTn>
-                              </p:par>
-                            </p:childTnLst>
-                          </p:cTn>
-                        </p:par>
-                      </p:childTnLst>
-                    </p:cTn>
-                  </p:par>
-                </p:childTnLst>
-              </p:cTn>
-              <p:prevCondLst>
-                <p:cond evt="onPrev" delay="0">
-                  <p:tgtEl>
-                    <p:sldTgt/>
-                  </p:tgtEl>
-                </p:cond>
-              </p:prevCondLst>
-              <p:nextCondLst>
-                <p:cond evt="onNext" delay="0">
-                  <p:tgtEl>
-                    <p:sldTgt/>
-                  </p:tgtEl>
-                </p:cond>
-              </p:nextCondLst>
-            </p:seq>
-          </p:childTnLst>
-        </p:cTn>
-      </p:par>
-    </p:tnLst>
-    <p:bldLst>
-      <p:bldP spid="5" grpId="0"/>
-    </p:bldLst>
-  </p:timing>
-</p:sld>
-</file>
-
-<file path=ppt/slides/slide33.xml><?xml version="1.0" encoding="utf-8"?>
-<p:sld xmlns:a="http://schemas.openxmlformats.org/drawingml/2006/main" xmlns:r="http://schemas.openxmlformats.org/officeDocument/2006/relationships" xmlns:p="http://schemas.openxmlformats.org/presentationml/2006/main">
-  <p:cSld>
-    <p:spTree>
-      <p:nvGrpSpPr>
-        <p:cNvPr id="1" name=""/>
-        <p:cNvGrpSpPr/>
-        <p:nvPr/>
-      </p:nvGrpSpPr>
-      <p:grpSpPr>
-        <a:xfrm>
-          <a:off x="0" y="0"/>
-          <a:ext cx="0" cy="0"/>
-          <a:chOff x="0" y="0"/>
-          <a:chExt cx="0" cy="0"/>
-        </a:xfrm>
-      </p:grpSpPr>
-      <p:sp>
-        <p:nvSpPr>
-          <p:cNvPr id="2" name="Title 1"/>
-          <p:cNvSpPr>
-            <a:spLocks noGrp="1"/>
-          </p:cNvSpPr>
-          <p:nvPr>
-            <p:ph type="title"/>
-          </p:nvPr>
-        </p:nvSpPr>
-        <p:spPr>
-          <a:xfrm>
-            <a:off x="1271357" y="4964896"/>
-            <a:ext cx="10742843" cy="1063387"/>
-          </a:xfrm>
-        </p:spPr>
-        <p:txBody>
-          <a:bodyPr>
-            <a:normAutofit/>
-          </a:bodyPr>
-          <a:lstStyle/>
-          <a:p>
-            <a:r>
-              <a:rPr lang="en-US" sz="4400" dirty="0">
-                <a:solidFill>
-                  <a:srgbClr val="DE411B"/>
-                </a:solidFill>
-              </a:rPr>
-              <a:t>6</a:t>
-            </a:r>
-            <a:r>
-              <a:rPr lang="sr-Latn-RS" sz="4400" dirty="0">
-                <a:solidFill>
-                  <a:srgbClr val="DE411B"/>
-                </a:solidFill>
-              </a:rPr>
-              <a:t>.</a:t>
-            </a:r>
-            <a:r>
-              <a:rPr lang="sr-Latn-RS" sz="4400" dirty="0"/>
-              <a:t> </a:t>
-            </a:r>
-            <a:r>
-              <a:rPr lang="en-US" sz="4400" dirty="0" err="1"/>
-              <a:t>VEžba</a:t>
-            </a:r>
-            <a:br>
-              <a:rPr lang="sr-Latn-RS" sz="4400" dirty="0"/>
-            </a:br>
-            <a:endParaRPr lang="en-GB" sz="4400" dirty="0">
-              <a:solidFill>
-                <a:srgbClr val="DE411B"/>
-              </a:solidFill>
-            </a:endParaRPr>
-          </a:p>
-        </p:txBody>
-      </p:sp>
-    </p:spTree>
-    <p:extLst>
-      <p:ext uri="{BB962C8B-B14F-4D97-AF65-F5344CB8AC3E}">
-        <p14:creationId xmlns:p14="http://schemas.microsoft.com/office/powerpoint/2010/main" val="3359582683"/>
-      </p:ext>
-    </p:extLst>
-  </p:cSld>
-  <p:clrMapOvr>
-    <a:masterClrMapping/>
-  </p:clrMapOvr>
-</p:sld>
-</file>
-
-<file path=ppt/slides/slide34.xml><?xml version="1.0" encoding="utf-8"?>
-<p:sld xmlns:a="http://schemas.openxmlformats.org/drawingml/2006/main" xmlns:r="http://schemas.openxmlformats.org/officeDocument/2006/relationships" xmlns:p="http://schemas.openxmlformats.org/presentationml/2006/main">
-  <p:cSld>
-    <p:spTree>
-      <p:nvGrpSpPr>
-        <p:cNvPr id="1" name=""/>
-        <p:cNvGrpSpPr/>
-        <p:nvPr/>
-      </p:nvGrpSpPr>
-      <p:grpSpPr>
-        <a:xfrm>
-          <a:off x="0" y="0"/>
-          <a:ext cx="0" cy="0"/>
-          <a:chOff x="0" y="0"/>
-          <a:chExt cx="0" cy="0"/>
-        </a:xfrm>
-      </p:grpSpPr>
-      <p:sp>
-        <p:nvSpPr>
-          <p:cNvPr id="6" name="Title 1"/>
-          <p:cNvSpPr>
-            <a:spLocks noGrp="1"/>
-          </p:cNvSpPr>
-          <p:nvPr>
-            <p:ph type="title"/>
-          </p:nvPr>
-        </p:nvSpPr>
-        <p:spPr>
-          <a:xfrm>
-            <a:off x="539206" y="172608"/>
-            <a:ext cx="11113588" cy="1025980"/>
-          </a:xfrm>
-        </p:spPr>
-        <p:txBody>
-          <a:bodyPr>
-            <a:normAutofit/>
-          </a:bodyPr>
-          <a:lstStyle/>
-          <a:p>
-            <a:r>
-              <a:rPr lang="en-US" dirty="0" err="1"/>
-              <a:t>Vežba</a:t>
-            </a:r>
-            <a:r>
-              <a:rPr lang="en-US" dirty="0"/>
-              <a:t> </a:t>
-            </a:r>
-          </a:p>
-        </p:txBody>
-      </p:sp>
-      <p:sp>
-        <p:nvSpPr>
-          <p:cNvPr id="5" name="Content Placeholder 4">
-            <a:extLst>
-              <a:ext uri="{FF2B5EF4-FFF2-40B4-BE49-F238E27FC236}">
-                <a16:creationId xmlns:a16="http://schemas.microsoft.com/office/drawing/2014/main" id="{90CB7C99-F337-4CFD-AA95-122E832BBF37}"/>
-              </a:ext>
-            </a:extLst>
-          </p:cNvPr>
-          <p:cNvSpPr txBox="1">
-            <a:spLocks/>
-          </p:cNvSpPr>
-          <p:nvPr/>
-        </p:nvSpPr>
-        <p:spPr>
-          <a:xfrm>
-            <a:off x="1032232" y="1313445"/>
-            <a:ext cx="10346198" cy="4278159"/>
-          </a:xfrm>
-          <a:prstGeom prst="rect">
-            <a:avLst/>
-          </a:prstGeom>
-        </p:spPr>
-        <p:txBody>
-          <a:bodyPr vert="horz" wrap="square" lIns="0" tIns="0" rIns="0" bIns="0" rtlCol="0">
-            <a:spAutoFit/>
-          </a:bodyPr>
-          <a:lstStyle>
-            <a:lvl1pPr marL="0" marR="0" indent="0" algn="l" defTabSz="914400" rtl="0" eaLnBrk="1" fontAlgn="auto" latinLnBrk="0" hangingPunct="1">
-              <a:lnSpc>
-                <a:spcPct val="100000"/>
-              </a:lnSpc>
-              <a:spcBef>
-                <a:spcPts val="1000"/>
-              </a:spcBef>
-              <a:spcAft>
-                <a:spcPts val="0"/>
-              </a:spcAft>
-              <a:buClrTx/>
-              <a:buSzTx/>
-              <a:buFontTx/>
-              <a:buNone/>
-              <a:tabLst/>
-              <a:defRPr lang="en-US" sz="1600" b="0" kern="1200" cap="none" baseline="0" dirty="0" smtClean="0">
-                <a:solidFill>
-                  <a:schemeClr val="tx1"/>
-                </a:solidFill>
-                <a:latin typeface="Arial" panose="020B0604020202020204" pitchFamily="34" charset="0"/>
-                <a:ea typeface="Arial" panose="020B0604020202020204" pitchFamily="34" charset="0"/>
-                <a:cs typeface="Arial" panose="020B0604020202020204" pitchFamily="34" charset="0"/>
-              </a:defRPr>
-            </a:lvl1pPr>
-            <a:lvl2pPr marL="285750" indent="-285750" algn="l" defTabSz="914400" rtl="0" eaLnBrk="1" latinLnBrk="0" hangingPunct="1">
-              <a:lnSpc>
-                <a:spcPct val="90000"/>
-              </a:lnSpc>
-              <a:spcBef>
-                <a:spcPts val="500"/>
-              </a:spcBef>
-              <a:buClr>
-                <a:srgbClr val="DE411B"/>
-              </a:buClr>
-              <a:buFont typeface="Wingdings" panose="05000000000000000000" pitchFamily="2" charset="2"/>
-              <a:buChar char="§"/>
-              <a:defRPr sz="1600" kern="1200">
-                <a:solidFill>
-                  <a:schemeClr val="tx1"/>
-                </a:solidFill>
-                <a:latin typeface="+mn-lt"/>
-                <a:ea typeface="+mn-ea"/>
-                <a:cs typeface="+mn-cs"/>
-              </a:defRPr>
-            </a:lvl2pPr>
-            <a:lvl3pPr marL="914400" indent="0" algn="l" defTabSz="914400" rtl="0" eaLnBrk="1" latinLnBrk="0" hangingPunct="1">
-              <a:lnSpc>
-                <a:spcPct val="90000"/>
-              </a:lnSpc>
-              <a:spcBef>
-                <a:spcPts val="500"/>
-              </a:spcBef>
-              <a:buClr>
-                <a:srgbClr val="81ADB5"/>
-              </a:buClr>
-              <a:buFontTx/>
-              <a:buNone/>
-              <a:defRPr sz="1600" kern="1200">
-                <a:solidFill>
-                  <a:schemeClr val="tx1"/>
-                </a:solidFill>
-                <a:latin typeface="+mn-lt"/>
-                <a:ea typeface="+mn-ea"/>
-                <a:cs typeface="+mn-cs"/>
-              </a:defRPr>
-            </a:lvl3pPr>
-            <a:lvl4pPr marL="1371600" indent="0" algn="l" defTabSz="914400" rtl="0" eaLnBrk="1" latinLnBrk="0" hangingPunct="1">
-              <a:lnSpc>
-                <a:spcPct val="90000"/>
-              </a:lnSpc>
-              <a:spcBef>
-                <a:spcPts val="500"/>
-              </a:spcBef>
-              <a:buFontTx/>
-              <a:buNone/>
-              <a:defRPr sz="1500" kern="1200">
-                <a:solidFill>
-                  <a:schemeClr val="tx1"/>
-                </a:solidFill>
-                <a:latin typeface="+mn-lt"/>
-                <a:ea typeface="+mn-ea"/>
-                <a:cs typeface="+mn-cs"/>
-              </a:defRPr>
-            </a:lvl4pPr>
-            <a:lvl5pPr marL="1828800" indent="0" algn="l" defTabSz="914400" rtl="0" eaLnBrk="1" latinLnBrk="0" hangingPunct="1">
-              <a:lnSpc>
-                <a:spcPct val="90000"/>
-              </a:lnSpc>
-              <a:spcBef>
-                <a:spcPts val="500"/>
-              </a:spcBef>
-              <a:buFontTx/>
-              <a:buNone/>
-              <a:defRPr sz="1400" kern="1200">
-                <a:solidFill>
-                  <a:schemeClr val="tx1"/>
-                </a:solidFill>
-                <a:latin typeface="+mn-lt"/>
-                <a:ea typeface="+mn-ea"/>
-                <a:cs typeface="+mn-cs"/>
-              </a:defRPr>
-            </a:lvl5pPr>
-            <a:lvl6pPr marL="2514600" indent="-228600" algn="l" defTabSz="914400" rtl="0" eaLnBrk="1" latinLnBrk="0" hangingPunct="1">
-              <a:lnSpc>
-                <a:spcPct val="90000"/>
-              </a:lnSpc>
-              <a:spcBef>
-                <a:spcPts val="500"/>
-              </a:spcBef>
-              <a:buFont typeface="Arial" panose="020B0604020202020204" pitchFamily="34" charset="0"/>
-              <a:buChar char="•"/>
-              <a:defRPr sz="1800" kern="1200">
-                <a:solidFill>
-                  <a:schemeClr val="tx1"/>
-                </a:solidFill>
-                <a:latin typeface="+mn-lt"/>
-                <a:ea typeface="+mn-ea"/>
-                <a:cs typeface="+mn-cs"/>
-              </a:defRPr>
-            </a:lvl6pPr>
-            <a:lvl7pPr marL="2971800" indent="-228600" algn="l" defTabSz="914400" rtl="0" eaLnBrk="1" latinLnBrk="0" hangingPunct="1">
-              <a:lnSpc>
-                <a:spcPct val="90000"/>
-              </a:lnSpc>
-              <a:spcBef>
-                <a:spcPts val="500"/>
-              </a:spcBef>
-              <a:buFont typeface="Arial" panose="020B0604020202020204" pitchFamily="34" charset="0"/>
-              <a:buChar char="•"/>
-              <a:defRPr sz="1800" kern="1200">
-                <a:solidFill>
-                  <a:schemeClr val="tx1"/>
-                </a:solidFill>
-                <a:latin typeface="+mn-lt"/>
-                <a:ea typeface="+mn-ea"/>
-                <a:cs typeface="+mn-cs"/>
-              </a:defRPr>
-            </a:lvl7pPr>
-            <a:lvl8pPr marL="3429000" indent="-228600" algn="l" defTabSz="914400" rtl="0" eaLnBrk="1" latinLnBrk="0" hangingPunct="1">
-              <a:lnSpc>
-                <a:spcPct val="90000"/>
-              </a:lnSpc>
-              <a:spcBef>
-                <a:spcPts val="500"/>
-              </a:spcBef>
-              <a:buFont typeface="Arial" panose="020B0604020202020204" pitchFamily="34" charset="0"/>
-              <a:buChar char="•"/>
-              <a:defRPr sz="1800" kern="1200">
-                <a:solidFill>
-                  <a:schemeClr val="tx1"/>
-                </a:solidFill>
-                <a:latin typeface="+mn-lt"/>
-                <a:ea typeface="+mn-ea"/>
-                <a:cs typeface="+mn-cs"/>
-              </a:defRPr>
-            </a:lvl8pPr>
-            <a:lvl9pPr marL="3886200" indent="-228600" algn="l" defTabSz="914400" rtl="0" eaLnBrk="1" latinLnBrk="0" hangingPunct="1">
-              <a:lnSpc>
-                <a:spcPct val="90000"/>
-              </a:lnSpc>
-              <a:spcBef>
-                <a:spcPts val="500"/>
-              </a:spcBef>
-              <a:buFont typeface="Arial" panose="020B0604020202020204" pitchFamily="34" charset="0"/>
-              <a:buChar char="•"/>
-              <a:defRPr sz="1800" kern="1200">
-                <a:solidFill>
-                  <a:schemeClr val="tx1"/>
-                </a:solidFill>
-                <a:latin typeface="+mn-lt"/>
-                <a:ea typeface="+mn-ea"/>
-                <a:cs typeface="+mn-cs"/>
-              </a:defRPr>
-            </a:lvl9pPr>
-          </a:lstStyle>
-          <a:p>
-            <a:pPr lvl="1">
-              <a:lnSpc>
-                <a:spcPct val="200000"/>
-              </a:lnSpc>
-              <a:buClr>
-                <a:srgbClr val="DF411C"/>
-              </a:buClr>
-            </a:pPr>
-            <a:endParaRPr lang="en-US" sz="2200" dirty="0"/>
-          </a:p>
-          <a:p>
-            <a:pPr lvl="1">
-              <a:lnSpc>
-                <a:spcPct val="200000"/>
-              </a:lnSpc>
-              <a:buClr>
-                <a:srgbClr val="DF411C"/>
-              </a:buClr>
-            </a:pPr>
-            <a:r>
-              <a:rPr lang="en-US" sz="2200" dirty="0"/>
-              <a:t>ZADATAK1: </a:t>
-            </a:r>
-            <a:r>
-              <a:rPr lang="en-US" sz="2200" dirty="0" err="1"/>
-              <a:t>Napisati</a:t>
-            </a:r>
-            <a:r>
-              <a:rPr lang="en-US" sz="2200" dirty="0"/>
-              <a:t> </a:t>
-            </a:r>
-            <a:r>
-              <a:rPr lang="en-US" sz="2200" dirty="0" err="1"/>
-              <a:t>zadatak</a:t>
-            </a:r>
-            <a:r>
-              <a:rPr lang="en-US" sz="2200" dirty="0"/>
-              <a:t> za </a:t>
-            </a:r>
-            <a:r>
-              <a:rPr lang="en-US" sz="2200" dirty="0" err="1"/>
-              <a:t>uspešno</a:t>
-            </a:r>
-            <a:r>
-              <a:rPr lang="en-US" sz="2200" dirty="0"/>
-              <a:t> </a:t>
-            </a:r>
-            <a:r>
-              <a:rPr lang="en-US" sz="2200" dirty="0" err="1"/>
-              <a:t>logovanje</a:t>
-            </a:r>
-            <a:r>
-              <a:rPr lang="en-US" sz="2200" dirty="0"/>
-              <a:t> </a:t>
-            </a:r>
-            <a:r>
-              <a:rPr lang="en-US" sz="2200" dirty="0" err="1"/>
-              <a:t>na</a:t>
-            </a:r>
-            <a:r>
-              <a:rPr lang="en-US" sz="2200" dirty="0"/>
-              <a:t> Samsara </a:t>
-            </a:r>
-            <a:r>
-              <a:rPr lang="en-US" sz="2200" dirty="0" err="1"/>
-              <a:t>aplikaciju</a:t>
-            </a:r>
-            <a:endParaRPr lang="en-US" sz="2200" dirty="0"/>
-          </a:p>
-          <a:p>
-            <a:pPr marL="0" lvl="1" indent="0">
-              <a:lnSpc>
-                <a:spcPct val="200000"/>
-              </a:lnSpc>
-              <a:buClr>
-                <a:srgbClr val="DF411C"/>
-              </a:buClr>
-              <a:buNone/>
-            </a:pPr>
-            <a:endParaRPr lang="en-US" sz="2200" i="1" dirty="0">
-              <a:solidFill>
-                <a:srgbClr val="00B050"/>
-              </a:solidFill>
-            </a:endParaRPr>
-          </a:p>
-          <a:p>
-            <a:pPr lvl="1">
-              <a:lnSpc>
-                <a:spcPct val="200000"/>
-              </a:lnSpc>
-              <a:buClr>
-                <a:srgbClr val="DF411C"/>
-              </a:buClr>
-            </a:pPr>
-            <a:r>
-              <a:rPr lang="en-US" sz="2200" dirty="0"/>
-              <a:t>ZADATAK2: </a:t>
-            </a:r>
-            <a:r>
-              <a:rPr lang="en-US" sz="2200" dirty="0" err="1"/>
-              <a:t>Napisati</a:t>
-            </a:r>
-            <a:r>
-              <a:rPr lang="en-US" sz="2200" dirty="0"/>
-              <a:t> </a:t>
-            </a:r>
-            <a:r>
-              <a:rPr lang="en-US" sz="2200" dirty="0" err="1"/>
-              <a:t>zadatak</a:t>
-            </a:r>
-            <a:r>
-              <a:rPr lang="en-US" sz="2200" dirty="0"/>
-              <a:t> za </a:t>
-            </a:r>
-            <a:r>
-              <a:rPr lang="en-US" sz="2200" dirty="0" err="1"/>
-              <a:t>neuspešno</a:t>
-            </a:r>
-            <a:r>
-              <a:rPr lang="en-US" sz="2200" dirty="0"/>
-              <a:t> </a:t>
-            </a:r>
-            <a:r>
-              <a:rPr lang="en-US" sz="2200" dirty="0" err="1"/>
-              <a:t>logovanje</a:t>
-            </a:r>
-            <a:r>
-              <a:rPr lang="en-US" sz="2200" dirty="0"/>
-              <a:t> </a:t>
-            </a:r>
-            <a:r>
-              <a:rPr lang="en-US" sz="2200" dirty="0" err="1"/>
-              <a:t>na</a:t>
-            </a:r>
-            <a:r>
-              <a:rPr lang="en-US" sz="2200" dirty="0"/>
-              <a:t> Samsara </a:t>
-            </a:r>
-            <a:r>
-              <a:rPr lang="en-US" sz="2200" dirty="0" err="1"/>
-              <a:t>aplikaciju</a:t>
-            </a:r>
-            <a:endParaRPr lang="en-US" sz="2200" dirty="0"/>
-          </a:p>
-          <a:p>
-            <a:pPr lvl="1">
-              <a:lnSpc>
-                <a:spcPct val="200000"/>
-              </a:lnSpc>
-              <a:buClr>
-                <a:srgbClr val="DF411C"/>
-              </a:buClr>
-            </a:pPr>
-            <a:endParaRPr lang="en-US" sz="2200" i="1" dirty="0">
-              <a:solidFill>
-                <a:srgbClr val="00B050"/>
-              </a:solidFill>
-            </a:endParaRPr>
-          </a:p>
-          <a:p>
-            <a:pPr lvl="1">
-              <a:lnSpc>
-                <a:spcPct val="200000"/>
-              </a:lnSpc>
-              <a:buClr>
-                <a:srgbClr val="DF411C"/>
-              </a:buClr>
-            </a:pPr>
-            <a:endParaRPr lang="en-US" sz="2200" dirty="0"/>
-          </a:p>
-        </p:txBody>
-      </p:sp>
-    </p:spTree>
-    <p:extLst>
-      <p:ext uri="{BB962C8B-B14F-4D97-AF65-F5344CB8AC3E}">
-        <p14:creationId xmlns:p14="http://schemas.microsoft.com/office/powerpoint/2010/main" val="3609394814"/>
-      </p:ext>
-    </p:extLst>
-  </p:cSld>
-  <p:clrMapOvr>
-    <a:masterClrMapping/>
-  </p:clrMapOvr>
-  <p:timing>
-    <p:tnLst>
-      <p:par>
-        <p:cTn id="1" dur="indefinite" restart="never" nodeType="tmRoot">
-          <p:childTnLst>
-            <p:seq concurrent="1" nextAc="seek">
-              <p:cTn id="2" dur="indefinite" nodeType="mainSeq">
-                <p:childTnLst>
-                  <p:par>
-                    <p:cTn id="3" fill="hold">
-                      <p:stCondLst>
-                        <p:cond delay="indefinite"/>
-                      </p:stCondLst>
-                      <p:childTnLst>
-                        <p:par>
-                          <p:cTn id="4" fill="hold">
-                            <p:stCondLst>
-                              <p:cond delay="0"/>
-                            </p:stCondLst>
-                            <p:childTnLst>
-                              <p:par>
-                                <p:cTn id="5" presetID="1" presetClass="entr" presetSubtype="0" fill="hold" grpId="0" nodeType="clickEffect">
-                                  <p:stCondLst>
-                                    <p:cond delay="0"/>
-                                  </p:stCondLst>
-                                  <p:childTnLst>
-                                    <p:set>
-                                      <p:cBhvr>
-                                        <p:cTn id="6" dur="1" fill="hold">
-                                          <p:stCondLst>
-                                            <p:cond delay="0"/>
-                                          </p:stCondLst>
-                                        </p:cTn>
-                                        <p:tgtEl>
-                                          <p:spTgt spid="5"/>
-                                        </p:tgtEl>
-                                        <p:attrNameLst>
-                                          <p:attrName>style.visibility</p:attrName>
-                                        </p:attrNameLst>
-                                      </p:cBhvr>
-                                      <p:to>
-                                        <p:strVal val="visible"/>
-                                      </p:to>
-                                    </p:set>
-                                  </p:childTnLst>
-                                </p:cTn>
-                              </p:par>
-                              <p:par>
-                                <p:cTn id="7" presetID="1" presetClass="entr" presetSubtype="0" fill="hold" nodeType="withEffect">
-                                  <p:stCondLst>
-                                    <p:cond delay="0"/>
-                                  </p:stCondLst>
-                                  <p:childTnLst>
-                                    <p:set>
-                                      <p:cBhvr>
-                                        <p:cTn id="8" dur="1" fill="hold">
-                                          <p:stCondLst>
-                                            <p:cond delay="0"/>
-                                          </p:stCondLst>
-                                        </p:cTn>
-                                        <p:tgtEl>
-                                          <p:spTgt spid="5">
-                                            <p:txEl>
-                                              <p:pRg st="1" end="1"/>
-                                            </p:txEl>
-                                          </p:spTgt>
-                                        </p:tgtEl>
-                                        <p:attrNameLst>
-                                          <p:attrName>style.visibility</p:attrName>
-                                        </p:attrNameLst>
-                                      </p:cBhvr>
-                                      <p:to>
-                                        <p:strVal val="visible"/>
-                                      </p:to>
-                                    </p:set>
-                                  </p:childTnLst>
-                                </p:cTn>
-                              </p:par>
-                              <p:par>
-                                <p:cTn id="9" presetID="1" presetClass="entr" presetSubtype="0" fill="hold" nodeType="withEffect">
-                                  <p:stCondLst>
-                                    <p:cond delay="0"/>
-                                  </p:stCondLst>
-                                  <p:childTnLst>
-                                    <p:set>
-                                      <p:cBhvr>
-                                        <p:cTn id="10" dur="1" fill="hold">
-                                          <p:stCondLst>
-                                            <p:cond delay="0"/>
-                                          </p:stCondLst>
-                                        </p:cTn>
-                                        <p:tgtEl>
-                                          <p:spTgt spid="5">
-                                            <p:txEl>
-                                              <p:pRg st="3" end="3"/>
-                                            </p:txEl>
-                                          </p:spTgt>
-                                        </p:tgtEl>
-                                        <p:attrNameLst>
-                                          <p:attrName>style.visibility</p:attrName>
-                                        </p:attrNameLst>
-                                      </p:cBhvr>
-                                      <p:to>
-                                        <p:strVal val="visible"/>
-                                      </p:to>
-                                    </p:set>
-                                  </p:childTnLst>
-                                </p:cTn>
-                              </p:par>
-                            </p:childTnLst>
-                          </p:cTn>
-                        </p:par>
-                      </p:childTnLst>
-                    </p:cTn>
-                  </p:par>
-                </p:childTnLst>
-              </p:cTn>
-              <p:prevCondLst>
-                <p:cond evt="onPrev" delay="0">
-                  <p:tgtEl>
-                    <p:sldTgt/>
-                  </p:tgtEl>
-                </p:cond>
-              </p:prevCondLst>
-              <p:nextCondLst>
-                <p:cond evt="onNext" delay="0">
-                  <p:tgtEl>
-                    <p:sldTgt/>
-                  </p:tgtEl>
-                </p:cond>
-              </p:nextCondLst>
-            </p:seq>
-          </p:childTnLst>
-        </p:cTn>
-      </p:par>
-    </p:tnLst>
-    <p:bldLst>
-      <p:bldP spid="5" grpId="0"/>
-    </p:bldLst>
-  </p:timing>
-</p:sld>
-</file>
-
-<file path=ppt/slides/slide35.xml><?xml version="1.0" encoding="utf-8"?>
-<p:sld xmlns:a="http://schemas.openxmlformats.org/drawingml/2006/main" xmlns:r="http://schemas.openxmlformats.org/officeDocument/2006/relationships" xmlns:p="http://schemas.openxmlformats.org/presentationml/2006/main">
-  <p:cSld>
-    <p:spTree>
-      <p:nvGrpSpPr>
-        <p:cNvPr id="1" name=""/>
-        <p:cNvGrpSpPr/>
-        <p:nvPr/>
-      </p:nvGrpSpPr>
-      <p:grpSpPr>
-        <a:xfrm>
-          <a:off x="0" y="0"/>
-          <a:ext cx="0" cy="0"/>
-          <a:chOff x="0" y="0"/>
-          <a:chExt cx="0" cy="0"/>
-        </a:xfrm>
-      </p:grpSpPr>
-      <p:sp>
-        <p:nvSpPr>
           <p:cNvPr id="2" name="Title 1"/>
           <p:cNvSpPr>
             <a:spLocks noGrp="1"/>
@@ -29074,7 +27823,7 @@
               <a:rPr lang="en-US" dirty="0">
                 <a:hlinkClick r:id="rId2"/>
               </a:rPr>
-              <a:t>jelena.pete@endava.com</a:t>
+              <a:t>slavicamastilovic.sulica@endava.com</a:t>
             </a:r>
             <a:endParaRPr lang="en-US" dirty="0"/>
           </a:p>
@@ -30265,6 +29014,14 @@
             <a:r>
               <a:rPr lang="en-US" sz="2200" dirty="0" err="1"/>
               <a:t>zahteva</a:t>
+            </a:r>
+            <a:r>
+              <a:rPr lang="en-US" sz="2200" dirty="0"/>
+              <a:t> </a:t>
+            </a:r>
+            <a:r>
+              <a:rPr lang="en-US" sz="2200" dirty="0" err="1"/>
+              <a:t>konstantno</a:t>
             </a:r>
             <a:r>
               <a:rPr lang="en-US" sz="2200" dirty="0"/>
@@ -31638,7 +30395,7 @@
         <p:spPr>
           <a:xfrm>
             <a:off x="724348" y="1870533"/>
-            <a:ext cx="10560423" cy="3721596"/>
+            <a:ext cx="10560423" cy="4524380"/>
           </a:xfrm>
           <a:prstGeom prst="rect">
             <a:avLst/>
@@ -31850,11 +30607,11 @@
             </a:r>
             <a:r>
               <a:rPr lang="en-US" sz="2200" dirty="0"/>
-              <a:t> (Web + Desktop) - </a:t>
+              <a:t> (Web) - </a:t>
             </a:r>
             <a:r>
               <a:rPr lang="en-US" sz="2400" dirty="0"/>
-              <a:t>Selenium, Cypress, Playwright, Squish…</a:t>
+              <a:t>Selenium, Cypress, Playwright, WebDriver IO…</a:t>
             </a:r>
             <a:endParaRPr lang="en-US" sz="2200" dirty="0"/>
           </a:p>
@@ -31899,12 +30656,22 @@
               <a:t> – </a:t>
             </a:r>
             <a:r>
-              <a:rPr lang="en-US" sz="2400" dirty="0" err="1"/>
-              <a:t>Jmeter</a:t>
-            </a:r>
-            <a:r>
               <a:rPr lang="en-US" sz="2400" dirty="0"/>
-              <a:t>…</a:t>
+              <a:t>JMeter…</a:t>
+            </a:r>
+          </a:p>
+          <a:p>
+            <a:pPr lvl="1">
+              <a:lnSpc>
+                <a:spcPct val="200000"/>
+              </a:lnSpc>
+              <a:buClr>
+                <a:srgbClr val="DF411C"/>
+              </a:buClr>
+            </a:pPr>
+            <a:r>
+              <a:rPr lang="en-US" sz="2400" dirty="0"/>
+              <a:t>Mobile - Apium</a:t>
             </a:r>
             <a:endParaRPr lang="sr-Latn-RS" sz="2200" dirty="0"/>
           </a:p>
@@ -33038,6 +31805,15 @@
 </file>
 
 <file path=customXml/item1.xml><?xml version="1.0" encoding="utf-8"?>
+<?mso-contentType ?>
+<FormTemplates xmlns="http://schemas.microsoft.com/sharepoint/v3/contenttype/forms">
+  <Display>DocumentLibraryForm</Display>
+  <Edit>DocumentLibraryForm</Edit>
+  <New>DocumentLibraryForm</New>
+</FormTemplates>
+</file>
+
+<file path=customXml/item2.xml><?xml version="1.0" encoding="utf-8"?>
 <ct:contentTypeSchema xmlns:ct="http://schemas.microsoft.com/office/2006/metadata/contentType" xmlns:ma="http://schemas.microsoft.com/office/2006/metadata/properties/metaAttributes" ct:_="" ma:_="" ma:contentTypeName="Document" ma:contentTypeID="0x010100CB48366BCCD67942B8674250044DBD67" ma:contentTypeVersion="12" ma:contentTypeDescription="Create a new document." ma:contentTypeScope="" ma:versionID="54f019c8bd0a8076286189fd1d11ca43">
   <xsd:schema xmlns:xsd="http://www.w3.org/2001/XMLSchema" xmlns:xs="http://www.w3.org/2001/XMLSchema" xmlns:p="http://schemas.microsoft.com/office/2006/metadata/properties" xmlns:ns2="e0114edf-9a72-4599-b1be-362d65013b4c" xmlns:ns3="c83bc204-c724-4af9-a3ff-094b77ae6203" targetNamespace="http://schemas.microsoft.com/office/2006/metadata/properties" ma:root="true" ma:fieldsID="76c859fd822d4a56b09d4259227ce2e0" ns2:_="" ns3:_="">
     <xsd:import namespace="e0114edf-9a72-4599-b1be-362d65013b4c"/>
@@ -33254,15 +32030,6 @@
 </ct:contentTypeSchema>
 </file>
 
-<file path=customXml/item2.xml><?xml version="1.0" encoding="utf-8"?>
-<?mso-contentType ?>
-<FormTemplates xmlns="http://schemas.microsoft.com/sharepoint/v3/contenttype/forms">
-  <Display>DocumentLibraryForm</Display>
-  <Edit>DocumentLibraryForm</Edit>
-  <New>DocumentLibraryForm</New>
-</FormTemplates>
-</file>
-
 <file path=customXml/item3.xml><?xml version="1.0" encoding="utf-8"?>
 <p:properties xmlns:p="http://schemas.microsoft.com/office/2006/metadata/properties" xmlns:xsi="http://www.w3.org/2001/XMLSchema-instance" xmlns:pc="http://schemas.microsoft.com/office/infopath/2007/PartnerControls">
   <documentManagement/>
@@ -33270,6 +32037,14 @@
 </file>
 
 <file path=customXml/itemProps1.xml><?xml version="1.0" encoding="utf-8"?>
+<ds:datastoreItem xmlns:ds="http://schemas.openxmlformats.org/officeDocument/2006/customXml" ds:itemID="{F42C2D96-7AE6-498C-A65A-58BFE51032EB}">
+  <ds:schemaRefs>
+    <ds:schemaRef ds:uri="http://schemas.microsoft.com/sharepoint/v3/contenttype/forms"/>
+  </ds:schemaRefs>
+</ds:datastoreItem>
+</file>
+
+<file path=customXml/itemProps2.xml><?xml version="1.0" encoding="utf-8"?>
 <ds:datastoreItem xmlns:ds="http://schemas.openxmlformats.org/officeDocument/2006/customXml" ds:itemID="{24619E38-97C9-4A02-87A1-917C4FEE9858}">
   <ds:schemaRefs>
     <ds:schemaRef ds:uri="http://schemas.microsoft.com/office/2006/metadata/contentType"/>
@@ -33284,14 +32059,6 @@
     <ds:schemaRef ds:uri="http://purl.org/dc/elements/1.1/"/>
     <ds:schemaRef ds:uri="http://purl.org/dc/terms/"/>
     <ds:schemaRef ds:uri="http://schemas.microsoft.com/internal/obd"/>
-  </ds:schemaRefs>
-</ds:datastoreItem>
-</file>
-
-<file path=customXml/itemProps2.xml><?xml version="1.0" encoding="utf-8"?>
-<ds:datastoreItem xmlns:ds="http://schemas.openxmlformats.org/officeDocument/2006/customXml" ds:itemID="{F42C2D96-7AE6-498C-A65A-58BFE51032EB}">
-  <ds:schemaRefs>
-    <ds:schemaRef ds:uri="http://schemas.microsoft.com/sharepoint/v3/contenttype/forms"/>
   </ds:schemaRefs>
 </ds:datastoreItem>
 </file>

</xml_diff>